<commit_message>
Ajuste Integrations Docker Swarm
</commit_message>
<xml_diff>
--- a/requisitos/SCJ-CONTAINER_TRABALHO_MOD.pptx
+++ b/requisitos/SCJ-CONTAINER_TRABALHO_MOD.pptx
@@ -5,17 +5,17 @@
     <p:sldMasterId id="2147483648" r:id="rId1"/>
   </p:sldMasterIdLst>
   <p:notesMasterIdLst>
-    <p:notesMasterId r:id="rId4"/>
+    <p:notesMasterId r:id="rId8"/>
   </p:notesMasterIdLst>
   <p:sldIdLst>
-    <p:sldId id="277" r:id="rId3"/>
-    <p:sldId id="260" r:id="rId5"/>
-    <p:sldId id="391" r:id="rId6"/>
-    <p:sldId id="396" r:id="rId7"/>
-    <p:sldId id="618" r:id="rId8"/>
-    <p:sldId id="619" r:id="rId9"/>
+    <p:sldId id="277" r:id="rId2"/>
+    <p:sldId id="260" r:id="rId3"/>
+    <p:sldId id="391" r:id="rId4"/>
+    <p:sldId id="396" r:id="rId5"/>
+    <p:sldId id="618" r:id="rId6"/>
+    <p:sldId id="619" r:id="rId7"/>
   </p:sldIdLst>
-  <p:sldSz cx="6858000" cy="5147945"/>
+  <p:sldSz cx="6858000" cy="5148263"/>
   <p:notesSz cx="6858000" cy="9144000"/>
   <p:defaultTextStyle>
     <a:defPPr>
@@ -112,6 +112,22 @@
       </a:defRPr>
     </a:lvl9pPr>
   </p:defaultTextStyle>
+  <p:extLst>
+    <p:ext uri="{EFAFB233-063F-42B5-8137-9DF3F51BA10A}">
+      <p15:sldGuideLst xmlns:p15="http://schemas.microsoft.com/office/powerpoint/2012/main">
+        <p15:guide id="1" orient="horz" pos="1622">
+          <p15:clr>
+            <a:srgbClr val="A4A3A4"/>
+          </p15:clr>
+        </p15:guide>
+        <p15:guide id="2" pos="2160">
+          <p15:clr>
+            <a:srgbClr val="A4A3A4"/>
+          </p15:clr>
+        </p15:guide>
+      </p15:sldGuideLst>
+    </p:ext>
+  </p:extLst>
 </p:presentation>
 </file>
 
@@ -197,6 +213,7 @@
           <a:p>
             <a:fld id="{288CB831-621B-B447-BA05-33BBB51106E9}" type="datetimeFigureOut">
               <a:rPr lang="en-US" smtClean="0"/>
+              <a:t>8/6/2022</a:t>
             </a:fld>
             <a:endParaRPr lang="en-US"/>
           </a:p>
@@ -263,7 +280,6 @@
               <a:rPr lang="en-US"/>
               <a:t>Click to edit Master text styles</a:t>
             </a:r>
-            <a:endParaRPr lang="en-US"/>
           </a:p>
           <a:p>
             <a:pPr lvl="1"/>
@@ -271,7 +287,6 @@
               <a:rPr lang="en-US"/>
               <a:t>Second level</a:t>
             </a:r>
-            <a:endParaRPr lang="en-US"/>
           </a:p>
           <a:p>
             <a:pPr lvl="2"/>
@@ -279,7 +294,6 @@
               <a:rPr lang="en-US"/>
               <a:t>Third level</a:t>
             </a:r>
-            <a:endParaRPr lang="en-US"/>
           </a:p>
           <a:p>
             <a:pPr lvl="3"/>
@@ -287,7 +301,6 @@
               <a:rPr lang="en-US"/>
               <a:t>Fourth level</a:t>
             </a:r>
-            <a:endParaRPr lang="en-US"/>
           </a:p>
           <a:p>
             <a:pPr lvl="4"/>
@@ -295,7 +308,6 @@
               <a:rPr lang="en-US"/>
               <a:t>Fifth level</a:t>
             </a:r>
-            <a:endParaRPr lang="en-US"/>
           </a:p>
         </p:txBody>
       </p:sp>
@@ -359,6 +371,7 @@
           <a:p>
             <a:fld id="{BAD8AFF9-521A-A140-89FE-20F54EFA29C0}" type="slidenum">
               <a:rPr lang="en-US" smtClean="0"/>
+              <a:t>‹nº›</a:t>
             </a:fld>
             <a:endParaRPr lang="en-US"/>
           </a:p>
@@ -463,7 +476,7 @@
 </file>
 
 <file path=ppt/notesSlides/notesSlide1.xml><?xml version="1.0" encoding="utf-8"?>
-<p:notes xmlns:a="http://schemas.openxmlformats.org/drawingml/2006/main" xmlns:r="http://schemas.openxmlformats.org/officeDocument/2006/relationships" xmlns:p="http://schemas.openxmlformats.org/presentationml/2006/main" showMasterPhAnim="0" showMasterSp="0">
+<p:notes xmlns:a="http://schemas.openxmlformats.org/drawingml/2006/main" xmlns:r="http://schemas.openxmlformats.org/officeDocument/2006/relationships" xmlns:p="http://schemas.openxmlformats.org/presentationml/2006/main" showMasterSp="0" showMasterPhAnim="0">
   <p:cSld>
     <p:spTree>
       <p:nvGrpSpPr>
@@ -513,6 +526,7 @@
               </a:spcAft>
               <a:buNone/>
             </a:pPr>
+            <a:endParaRPr/>
           </a:p>
         </p:txBody>
       </p:sp>
@@ -566,7 +580,7 @@
 </file>
 
 <file path=ppt/notesSlides/notesSlide2.xml><?xml version="1.0" encoding="utf-8"?>
-<p:notes xmlns:a="http://schemas.openxmlformats.org/drawingml/2006/main" xmlns:r="http://schemas.openxmlformats.org/officeDocument/2006/relationships" xmlns:p="http://schemas.openxmlformats.org/presentationml/2006/main" showMasterPhAnim="0" showMasterSp="0">
+<p:notes xmlns:a="http://schemas.openxmlformats.org/drawingml/2006/main" xmlns:r="http://schemas.openxmlformats.org/officeDocument/2006/relationships" xmlns:p="http://schemas.openxmlformats.org/presentationml/2006/main" showMasterSp="0" showMasterPhAnim="0">
   <p:cSld>
     <p:spTree>
       <p:nvGrpSpPr>
@@ -864,6 +878,7 @@
           <a:p>
             <a:fld id="{08B874B1-D9C3-694D-A4DA-18092E26C5F8}" type="datetimeFigureOut">
               <a:rPr lang="en-US" smtClean="0"/>
+              <a:t>8/6/2022</a:t>
             </a:fld>
             <a:endParaRPr lang="en-US"/>
           </a:p>
@@ -921,6 +936,7 @@
           <a:p>
             <a:fld id="{3B555A39-F4FC-2F4C-BCD2-8F8E6BD40159}" type="slidenum">
               <a:rPr lang="en-US" smtClean="0"/>
+              <a:t>‹nº›</a:t>
             </a:fld>
             <a:endParaRPr lang="en-US"/>
           </a:p>
@@ -1010,7 +1026,6 @@
               <a:rPr lang="x-none"/>
               <a:t>Click to edit Master text styles</a:t>
             </a:r>
-            <a:endParaRPr lang="x-none"/>
           </a:p>
           <a:p>
             <a:pPr lvl="1"/>
@@ -1018,7 +1033,6 @@
               <a:rPr lang="x-none"/>
               <a:t>Second level</a:t>
             </a:r>
-            <a:endParaRPr lang="x-none"/>
           </a:p>
           <a:p>
             <a:pPr lvl="2"/>
@@ -1026,7 +1040,6 @@
               <a:rPr lang="x-none"/>
               <a:t>Third level</a:t>
             </a:r>
-            <a:endParaRPr lang="x-none"/>
           </a:p>
           <a:p>
             <a:pPr lvl="3"/>
@@ -1034,7 +1047,6 @@
               <a:rPr lang="x-none"/>
               <a:t>Fourth level</a:t>
             </a:r>
-            <a:endParaRPr lang="x-none"/>
           </a:p>
           <a:p>
             <a:pPr lvl="4"/>
@@ -1071,6 +1083,7 @@
           <a:p>
             <a:fld id="{08B874B1-D9C3-694D-A4DA-18092E26C5F8}" type="datetimeFigureOut">
               <a:rPr lang="en-US" smtClean="0"/>
+              <a:t>8/6/2022</a:t>
             </a:fld>
             <a:endParaRPr lang="en-US"/>
           </a:p>
@@ -1128,6 +1141,7 @@
           <a:p>
             <a:fld id="{3B555A39-F4FC-2F4C-BCD2-8F8E6BD40159}" type="slidenum">
               <a:rPr lang="en-US" smtClean="0"/>
+              <a:t>‹nº›</a:t>
             </a:fld>
             <a:endParaRPr lang="en-US"/>
           </a:p>
@@ -1217,7 +1231,6 @@
               <a:rPr lang="x-none"/>
               <a:t>Click to edit Master text styles</a:t>
             </a:r>
-            <a:endParaRPr lang="x-none"/>
           </a:p>
           <a:p>
             <a:pPr lvl="1"/>
@@ -1225,7 +1238,6 @@
               <a:rPr lang="x-none"/>
               <a:t>Second level</a:t>
             </a:r>
-            <a:endParaRPr lang="x-none"/>
           </a:p>
           <a:p>
             <a:pPr lvl="2"/>
@@ -1233,7 +1245,6 @@
               <a:rPr lang="x-none"/>
               <a:t>Third level</a:t>
             </a:r>
-            <a:endParaRPr lang="x-none"/>
           </a:p>
           <a:p>
             <a:pPr lvl="3"/>
@@ -1241,7 +1252,6 @@
               <a:rPr lang="x-none"/>
               <a:t>Fourth level</a:t>
             </a:r>
-            <a:endParaRPr lang="x-none"/>
           </a:p>
           <a:p>
             <a:pPr lvl="4"/>
@@ -1278,6 +1288,7 @@
           <a:p>
             <a:fld id="{08B874B1-D9C3-694D-A4DA-18092E26C5F8}" type="datetimeFigureOut">
               <a:rPr lang="en-US" smtClean="0"/>
+              <a:t>8/6/2022</a:t>
             </a:fld>
             <a:endParaRPr lang="en-US"/>
           </a:p>
@@ -1335,6 +1346,7 @@
           <a:p>
             <a:fld id="{3B555A39-F4FC-2F4C-BCD2-8F8E6BD40159}" type="slidenum">
               <a:rPr lang="en-US" smtClean="0"/>
+              <a:t>‹nº›</a:t>
             </a:fld>
             <a:endParaRPr lang="en-US"/>
           </a:p>
@@ -1599,7 +1611,9 @@
               </a:defRPr>
             </a:lvl9pPr>
           </a:lstStyle>
-          <a:p/>
+          <a:p>
+            <a:endParaRPr/>
+          </a:p>
         </p:txBody>
       </p:sp>
     </p:spTree>
@@ -1861,7 +1875,9 @@
               </a:defRPr>
             </a:lvl9pPr>
           </a:lstStyle>
-          <a:p/>
+          <a:p>
+            <a:endParaRPr/>
+          </a:p>
         </p:txBody>
       </p:sp>
     </p:spTree>
@@ -1948,7 +1964,6 @@
               <a:rPr lang="x-none"/>
               <a:t>Click to edit Master text styles</a:t>
             </a:r>
-            <a:endParaRPr lang="x-none"/>
           </a:p>
           <a:p>
             <a:pPr lvl="1"/>
@@ -1956,7 +1971,6 @@
               <a:rPr lang="x-none"/>
               <a:t>Second level</a:t>
             </a:r>
-            <a:endParaRPr lang="x-none"/>
           </a:p>
           <a:p>
             <a:pPr lvl="2"/>
@@ -1964,7 +1978,6 @@
               <a:rPr lang="x-none"/>
               <a:t>Third level</a:t>
             </a:r>
-            <a:endParaRPr lang="x-none"/>
           </a:p>
           <a:p>
             <a:pPr lvl="3"/>
@@ -1972,7 +1985,6 @@
               <a:rPr lang="x-none"/>
               <a:t>Fourth level</a:t>
             </a:r>
-            <a:endParaRPr lang="x-none"/>
           </a:p>
           <a:p>
             <a:pPr lvl="4"/>
@@ -2009,6 +2021,7 @@
           <a:p>
             <a:fld id="{08B874B1-D9C3-694D-A4DA-18092E26C5F8}" type="datetimeFigureOut">
               <a:rPr lang="en-US" smtClean="0"/>
+              <a:t>8/6/2022</a:t>
             </a:fld>
             <a:endParaRPr lang="en-US"/>
           </a:p>
@@ -2066,6 +2079,7 @@
           <a:p>
             <a:fld id="{3B555A39-F4FC-2F4C-BCD2-8F8E6BD40159}" type="slidenum">
               <a:rPr lang="en-US" smtClean="0"/>
+              <a:t>‹nº›</a:t>
             </a:fld>
             <a:endParaRPr lang="en-US"/>
           </a:p>
@@ -2250,7 +2264,6 @@
               <a:rPr lang="x-none"/>
               <a:t>Click to edit Master text styles</a:t>
             </a:r>
-            <a:endParaRPr lang="x-none"/>
           </a:p>
         </p:txBody>
       </p:sp>
@@ -2279,6 +2292,7 @@
           <a:p>
             <a:fld id="{08B874B1-D9C3-694D-A4DA-18092E26C5F8}" type="datetimeFigureOut">
               <a:rPr lang="en-US" smtClean="0"/>
+              <a:t>8/6/2022</a:t>
             </a:fld>
             <a:endParaRPr lang="en-US"/>
           </a:p>
@@ -2336,6 +2350,7 @@
           <a:p>
             <a:fld id="{3B555A39-F4FC-2F4C-BCD2-8F8E6BD40159}" type="slidenum">
               <a:rPr lang="en-US" smtClean="0"/>
+              <a:t>‹nº›</a:t>
             </a:fld>
             <a:endParaRPr lang="en-US"/>
           </a:p>
@@ -2453,7 +2468,6 @@
               <a:rPr lang="x-none"/>
               <a:t>Click to edit Master text styles</a:t>
             </a:r>
-            <a:endParaRPr lang="x-none"/>
           </a:p>
           <a:p>
             <a:pPr lvl="1"/>
@@ -2461,7 +2475,6 @@
               <a:rPr lang="x-none"/>
               <a:t>Second level</a:t>
             </a:r>
-            <a:endParaRPr lang="x-none"/>
           </a:p>
           <a:p>
             <a:pPr lvl="2"/>
@@ -2469,7 +2482,6 @@
               <a:rPr lang="x-none"/>
               <a:t>Third level</a:t>
             </a:r>
-            <a:endParaRPr lang="x-none"/>
           </a:p>
           <a:p>
             <a:pPr lvl="3"/>
@@ -2477,7 +2489,6 @@
               <a:rPr lang="x-none"/>
               <a:t>Fourth level</a:t>
             </a:r>
-            <a:endParaRPr lang="x-none"/>
           </a:p>
           <a:p>
             <a:pPr lvl="4"/>
@@ -2545,7 +2556,6 @@
               <a:rPr lang="x-none"/>
               <a:t>Click to edit Master text styles</a:t>
             </a:r>
-            <a:endParaRPr lang="x-none"/>
           </a:p>
           <a:p>
             <a:pPr lvl="1"/>
@@ -2553,7 +2563,6 @@
               <a:rPr lang="x-none"/>
               <a:t>Second level</a:t>
             </a:r>
-            <a:endParaRPr lang="x-none"/>
           </a:p>
           <a:p>
             <a:pPr lvl="2"/>
@@ -2561,7 +2570,6 @@
               <a:rPr lang="x-none"/>
               <a:t>Third level</a:t>
             </a:r>
-            <a:endParaRPr lang="x-none"/>
           </a:p>
           <a:p>
             <a:pPr lvl="3"/>
@@ -2569,7 +2577,6 @@
               <a:rPr lang="x-none"/>
               <a:t>Fourth level</a:t>
             </a:r>
-            <a:endParaRPr lang="x-none"/>
           </a:p>
           <a:p>
             <a:pPr lvl="4"/>
@@ -2606,6 +2613,7 @@
           <a:p>
             <a:fld id="{08B874B1-D9C3-694D-A4DA-18092E26C5F8}" type="datetimeFigureOut">
               <a:rPr lang="en-US" smtClean="0"/>
+              <a:t>8/6/2022</a:t>
             </a:fld>
             <a:endParaRPr lang="en-US"/>
           </a:p>
@@ -2663,6 +2671,7 @@
           <a:p>
             <a:fld id="{3B555A39-F4FC-2F4C-BCD2-8F8E6BD40159}" type="slidenum">
               <a:rPr lang="en-US" smtClean="0"/>
+              <a:t>‹nº›</a:t>
             </a:fld>
             <a:endParaRPr lang="en-US"/>
           </a:p>
@@ -2793,7 +2802,6 @@
               <a:rPr lang="x-none"/>
               <a:t>Click to edit Master text styles</a:t>
             </a:r>
-            <a:endParaRPr lang="x-none"/>
           </a:p>
         </p:txBody>
       </p:sp>
@@ -2853,7 +2861,6 @@
               <a:rPr lang="x-none"/>
               <a:t>Click to edit Master text styles</a:t>
             </a:r>
-            <a:endParaRPr lang="x-none"/>
           </a:p>
           <a:p>
             <a:pPr lvl="1"/>
@@ -2861,7 +2868,6 @@
               <a:rPr lang="x-none"/>
               <a:t>Second level</a:t>
             </a:r>
-            <a:endParaRPr lang="x-none"/>
           </a:p>
           <a:p>
             <a:pPr lvl="2"/>
@@ -2869,7 +2875,6 @@
               <a:rPr lang="x-none"/>
               <a:t>Third level</a:t>
             </a:r>
-            <a:endParaRPr lang="x-none"/>
           </a:p>
           <a:p>
             <a:pPr lvl="3"/>
@@ -2877,7 +2882,6 @@
               <a:rPr lang="x-none"/>
               <a:t>Fourth level</a:t>
             </a:r>
-            <a:endParaRPr lang="x-none"/>
           </a:p>
           <a:p>
             <a:pPr lvl="4"/>
@@ -2954,7 +2958,6 @@
               <a:rPr lang="x-none"/>
               <a:t>Click to edit Master text styles</a:t>
             </a:r>
-            <a:endParaRPr lang="x-none"/>
           </a:p>
         </p:txBody>
       </p:sp>
@@ -3014,7 +3017,6 @@
               <a:rPr lang="x-none"/>
               <a:t>Click to edit Master text styles</a:t>
             </a:r>
-            <a:endParaRPr lang="x-none"/>
           </a:p>
           <a:p>
             <a:pPr lvl="1"/>
@@ -3022,7 +3024,6 @@
               <a:rPr lang="x-none"/>
               <a:t>Second level</a:t>
             </a:r>
-            <a:endParaRPr lang="x-none"/>
           </a:p>
           <a:p>
             <a:pPr lvl="2"/>
@@ -3030,7 +3031,6 @@
               <a:rPr lang="x-none"/>
               <a:t>Third level</a:t>
             </a:r>
-            <a:endParaRPr lang="x-none"/>
           </a:p>
           <a:p>
             <a:pPr lvl="3"/>
@@ -3038,7 +3038,6 @@
               <a:rPr lang="x-none"/>
               <a:t>Fourth level</a:t>
             </a:r>
-            <a:endParaRPr lang="x-none"/>
           </a:p>
           <a:p>
             <a:pPr lvl="4"/>
@@ -3075,6 +3074,7 @@
           <a:p>
             <a:fld id="{08B874B1-D9C3-694D-A4DA-18092E26C5F8}" type="datetimeFigureOut">
               <a:rPr lang="en-US" smtClean="0"/>
+              <a:t>8/6/2022</a:t>
             </a:fld>
             <a:endParaRPr lang="en-US"/>
           </a:p>
@@ -3132,6 +3132,7 @@
           <a:p>
             <a:fld id="{3B555A39-F4FC-2F4C-BCD2-8F8E6BD40159}" type="slidenum">
               <a:rPr lang="en-US" smtClean="0"/>
+              <a:t>‹nº›</a:t>
             </a:fld>
             <a:endParaRPr lang="en-US"/>
           </a:p>
@@ -3218,6 +3219,7 @@
           <a:p>
             <a:fld id="{08B874B1-D9C3-694D-A4DA-18092E26C5F8}" type="datetimeFigureOut">
               <a:rPr lang="en-US" smtClean="0"/>
+              <a:t>8/6/2022</a:t>
             </a:fld>
             <a:endParaRPr lang="en-US"/>
           </a:p>
@@ -3275,6 +3277,7 @@
           <a:p>
             <a:fld id="{3B555A39-F4FC-2F4C-BCD2-8F8E6BD40159}" type="slidenum">
               <a:rPr lang="en-US" smtClean="0"/>
+              <a:t>‹nº›</a:t>
             </a:fld>
             <a:endParaRPr lang="en-US"/>
           </a:p>
@@ -3330,6 +3333,7 @@
           <a:p>
             <a:fld id="{08B874B1-D9C3-694D-A4DA-18092E26C5F8}" type="datetimeFigureOut">
               <a:rPr lang="en-US" smtClean="0"/>
+              <a:t>8/6/2022</a:t>
             </a:fld>
             <a:endParaRPr lang="en-US"/>
           </a:p>
@@ -3387,6 +3391,7 @@
           <a:p>
             <a:fld id="{3B555A39-F4FC-2F4C-BCD2-8F8E6BD40159}" type="slidenum">
               <a:rPr lang="en-US" smtClean="0"/>
+              <a:t>‹nº›</a:t>
             </a:fld>
             <a:endParaRPr lang="en-US"/>
           </a:p>
@@ -3508,7 +3513,6 @@
               <a:rPr lang="x-none"/>
               <a:t>Click to edit Master text styles</a:t>
             </a:r>
-            <a:endParaRPr lang="x-none"/>
           </a:p>
           <a:p>
             <a:pPr lvl="1"/>
@@ -3516,7 +3520,6 @@
               <a:rPr lang="x-none"/>
               <a:t>Second level</a:t>
             </a:r>
-            <a:endParaRPr lang="x-none"/>
           </a:p>
           <a:p>
             <a:pPr lvl="2"/>
@@ -3524,7 +3527,6 @@
               <a:rPr lang="x-none"/>
               <a:t>Third level</a:t>
             </a:r>
-            <a:endParaRPr lang="x-none"/>
           </a:p>
           <a:p>
             <a:pPr lvl="3"/>
@@ -3532,7 +3534,6 @@
               <a:rPr lang="x-none"/>
               <a:t>Fourth level</a:t>
             </a:r>
-            <a:endParaRPr lang="x-none"/>
           </a:p>
           <a:p>
             <a:pPr lvl="4"/>
@@ -3609,7 +3610,6 @@
               <a:rPr lang="x-none"/>
               <a:t>Click to edit Master text styles</a:t>
             </a:r>
-            <a:endParaRPr lang="x-none"/>
           </a:p>
         </p:txBody>
       </p:sp>
@@ -3638,6 +3638,7 @@
           <a:p>
             <a:fld id="{08B874B1-D9C3-694D-A4DA-18092E26C5F8}" type="datetimeFigureOut">
               <a:rPr lang="en-US" smtClean="0"/>
+              <a:t>8/6/2022</a:t>
             </a:fld>
             <a:endParaRPr lang="en-US"/>
           </a:p>
@@ -3695,6 +3696,7 @@
           <a:p>
             <a:fld id="{3B555A39-F4FC-2F4C-BCD2-8F8E6BD40159}" type="slidenum">
               <a:rPr lang="en-US" smtClean="0"/>
+              <a:t>‹nº›</a:t>
             </a:fld>
             <a:endParaRPr lang="en-US"/>
           </a:p>
@@ -3889,7 +3891,6 @@
               <a:rPr lang="x-none"/>
               <a:t>Click to edit Master text styles</a:t>
             </a:r>
-            <a:endParaRPr lang="x-none"/>
           </a:p>
         </p:txBody>
       </p:sp>
@@ -3918,6 +3919,7 @@
           <a:p>
             <a:fld id="{08B874B1-D9C3-694D-A4DA-18092E26C5F8}" type="datetimeFigureOut">
               <a:rPr lang="en-US" smtClean="0"/>
+              <a:t>8/6/2022</a:t>
             </a:fld>
             <a:endParaRPr lang="en-US"/>
           </a:p>
@@ -3975,6 +3977,7 @@
           <a:p>
             <a:fld id="{3B555A39-F4FC-2F4C-BCD2-8F8E6BD40159}" type="slidenum">
               <a:rPr lang="en-US" smtClean="0"/>
+              <a:t>‹nº›</a:t>
             </a:fld>
             <a:endParaRPr lang="en-US"/>
           </a:p>
@@ -4019,252 +4022,6 @@
           <p:nvPr userDrawn="1"/>
         </p:nvPicPr>
         <p:blipFill>
-          <a:blip r:embed="rId14">
-            <a:extLst>
-              <a:ext uri="{28A0092B-C50C-407E-A947-70E740481C1C}">
-                <a14:useLocalDpi xmlns:a14="http://schemas.microsoft.com/office/drawing/2010/main" val="0"/>
-              </a:ext>
-            </a:extLst>
-          </a:blip>
-          <a:stretch>
-            <a:fillRect/>
-          </a:stretch>
-        </p:blipFill>
-        <p:spPr>
-          <a:xfrm>
-            <a:off x="0" y="-6513"/>
-            <a:ext cx="9164044" cy="5154776"/>
-          </a:xfrm>
-          <a:prstGeom prst="rect">
-            <a:avLst/>
-          </a:prstGeom>
-        </p:spPr>
-      </p:pic>
-      <p:sp>
-        <p:nvSpPr>
-          <p:cNvPr id="2" name="Title Placeholder 1"/>
-          <p:cNvSpPr>
-            <a:spLocks noGrp="1"/>
-          </p:cNvSpPr>
-          <p:nvPr>
-            <p:ph type="title"/>
-          </p:nvPr>
-        </p:nvSpPr>
-        <p:spPr>
-          <a:xfrm>
-            <a:off x="342900" y="206169"/>
-            <a:ext cx="6172200" cy="858044"/>
-          </a:xfrm>
-          <a:prstGeom prst="rect">
-            <a:avLst/>
-          </a:prstGeom>
-        </p:spPr>
-        <p:txBody>
-          <a:bodyPr vert="horz" lIns="68544" tIns="34272" rIns="68544" bIns="34272" rtlCol="0" anchor="ctr">
-            <a:normAutofit/>
-          </a:bodyPr>
-          <a:lstStyle/>
-          <a:p>
-            <a:r>
-              <a:rPr lang="x-none"/>
-              <a:t>Click to edit Master title style</a:t>
-            </a:r>
-            <a:endParaRPr lang="en-US"/>
-          </a:p>
-        </p:txBody>
-      </p:sp>
-      <p:sp>
-        <p:nvSpPr>
-          <p:cNvPr id="3" name="Text Placeholder 2"/>
-          <p:cNvSpPr>
-            <a:spLocks noGrp="1"/>
-          </p:cNvSpPr>
-          <p:nvPr>
-            <p:ph type="body" idx="1"/>
-          </p:nvPr>
-        </p:nvSpPr>
-        <p:spPr>
-          <a:xfrm>
-            <a:off x="342900" y="1201262"/>
-            <a:ext cx="6172200" cy="3397616"/>
-          </a:xfrm>
-          <a:prstGeom prst="rect">
-            <a:avLst/>
-          </a:prstGeom>
-        </p:spPr>
-        <p:txBody>
-          <a:bodyPr vert="horz" lIns="68544" tIns="34272" rIns="68544" bIns="34272" rtlCol="0">
-            <a:normAutofit/>
-          </a:bodyPr>
-          <a:lstStyle/>
-          <a:p>
-            <a:pPr lvl="0"/>
-            <a:r>
-              <a:rPr lang="x-none"/>
-              <a:t>Click to edit Master text styles</a:t>
-            </a:r>
-            <a:endParaRPr lang="x-none"/>
-          </a:p>
-          <a:p>
-            <a:pPr lvl="1"/>
-            <a:r>
-              <a:rPr lang="x-none"/>
-              <a:t>Second level</a:t>
-            </a:r>
-            <a:endParaRPr lang="x-none"/>
-          </a:p>
-          <a:p>
-            <a:pPr lvl="2"/>
-            <a:r>
-              <a:rPr lang="x-none"/>
-              <a:t>Third level</a:t>
-            </a:r>
-            <a:endParaRPr lang="x-none"/>
-          </a:p>
-          <a:p>
-            <a:pPr lvl="3"/>
-            <a:r>
-              <a:rPr lang="x-none"/>
-              <a:t>Fourth level</a:t>
-            </a:r>
-            <a:endParaRPr lang="x-none"/>
-          </a:p>
-          <a:p>
-            <a:pPr lvl="4"/>
-            <a:r>
-              <a:rPr lang="x-none"/>
-              <a:t>Fifth level</a:t>
-            </a:r>
-            <a:endParaRPr lang="en-US"/>
-          </a:p>
-        </p:txBody>
-      </p:sp>
-      <p:sp>
-        <p:nvSpPr>
-          <p:cNvPr id="4" name="Date Placeholder 3"/>
-          <p:cNvSpPr>
-            <a:spLocks noGrp="1"/>
-          </p:cNvSpPr>
-          <p:nvPr>
-            <p:ph type="dt" sz="half" idx="2"/>
-          </p:nvPr>
-        </p:nvSpPr>
-        <p:spPr>
-          <a:xfrm>
-            <a:off x="342900" y="4771684"/>
-            <a:ext cx="1600200" cy="274097"/>
-          </a:xfrm>
-          <a:prstGeom prst="rect">
-            <a:avLst/>
-          </a:prstGeom>
-        </p:spPr>
-        <p:txBody>
-          <a:bodyPr vert="horz" lIns="68544" tIns="34272" rIns="68544" bIns="34272" rtlCol="0" anchor="ctr"/>
-          <a:lstStyle>
-            <a:lvl1pPr algn="l">
-              <a:defRPr sz="900">
-                <a:solidFill>
-                  <a:schemeClr val="tx1">
-                    <a:tint val="75000"/>
-                  </a:schemeClr>
-                </a:solidFill>
-              </a:defRPr>
-            </a:lvl1pPr>
-          </a:lstStyle>
-          <a:p>
-            <a:fld id="{6B3695D4-C2E3-524A-A154-E6036064930E}" type="datetimeFigureOut">
-              <a:rPr lang="en-US" smtClean="0"/>
-            </a:fld>
-            <a:endParaRPr lang="en-US"/>
-          </a:p>
-        </p:txBody>
-      </p:sp>
-      <p:sp>
-        <p:nvSpPr>
-          <p:cNvPr id="5" name="Footer Placeholder 4"/>
-          <p:cNvSpPr>
-            <a:spLocks noGrp="1"/>
-          </p:cNvSpPr>
-          <p:nvPr>
-            <p:ph type="ftr" sz="quarter" idx="3"/>
-          </p:nvPr>
-        </p:nvSpPr>
-        <p:spPr>
-          <a:xfrm>
-            <a:off x="2343150" y="4771684"/>
-            <a:ext cx="2171700" cy="274097"/>
-          </a:xfrm>
-          <a:prstGeom prst="rect">
-            <a:avLst/>
-          </a:prstGeom>
-        </p:spPr>
-        <p:txBody>
-          <a:bodyPr vert="horz" lIns="68544" tIns="34272" rIns="68544" bIns="34272" rtlCol="0" anchor="ctr"/>
-          <a:lstStyle>
-            <a:lvl1pPr algn="ctr">
-              <a:defRPr sz="900">
-                <a:solidFill>
-                  <a:schemeClr val="tx1">
-                    <a:tint val="75000"/>
-                  </a:schemeClr>
-                </a:solidFill>
-              </a:defRPr>
-            </a:lvl1pPr>
-          </a:lstStyle>
-          <a:p>
-            <a:endParaRPr lang="en-US"/>
-          </a:p>
-        </p:txBody>
-      </p:sp>
-      <p:sp>
-        <p:nvSpPr>
-          <p:cNvPr id="6" name="Slide Number Placeholder 5"/>
-          <p:cNvSpPr>
-            <a:spLocks noGrp="1"/>
-          </p:cNvSpPr>
-          <p:nvPr>
-            <p:ph type="sldNum" sz="quarter" idx="4"/>
-          </p:nvPr>
-        </p:nvSpPr>
-        <p:spPr>
-          <a:xfrm>
-            <a:off x="4914900" y="4771684"/>
-            <a:ext cx="1600200" cy="274097"/>
-          </a:xfrm>
-          <a:prstGeom prst="rect">
-            <a:avLst/>
-          </a:prstGeom>
-        </p:spPr>
-        <p:txBody>
-          <a:bodyPr vert="horz" lIns="68544" tIns="34272" rIns="68544" bIns="34272" rtlCol="0" anchor="ctr"/>
-          <a:lstStyle>
-            <a:lvl1pPr algn="r">
-              <a:defRPr sz="900">
-                <a:solidFill>
-                  <a:schemeClr val="tx1">
-                    <a:tint val="75000"/>
-                  </a:schemeClr>
-                </a:solidFill>
-              </a:defRPr>
-            </a:lvl1pPr>
-          </a:lstStyle>
-          <a:p>
-            <a:fld id="{495CFD00-10A0-8A42-BC0C-7FB4973ACCF2}" type="slidenum">
-              <a:rPr lang="en-US" smtClean="0"/>
-            </a:fld>
-            <a:endParaRPr lang="en-US"/>
-          </a:p>
-        </p:txBody>
-      </p:sp>
-      <p:pic>
-        <p:nvPicPr>
-          <p:cNvPr id="14" name="Picture 6" descr="fiap_elemento.png"/>
-          <p:cNvPicPr>
-            <a:picLocks noChangeAspect="1"/>
-          </p:cNvPicPr>
-          <p:nvPr userDrawn="1"/>
-        </p:nvPicPr>
-        <p:blipFill>
           <a:blip r:embed="rId15">
             <a:extLst>
               <a:ext uri="{28A0092B-C50C-407E-A947-70E740481C1C}">
@@ -4278,6 +4035,250 @@
         </p:blipFill>
         <p:spPr>
           <a:xfrm>
+            <a:off x="0" y="-6513"/>
+            <a:ext cx="9164044" cy="5154776"/>
+          </a:xfrm>
+          <a:prstGeom prst="rect">
+            <a:avLst/>
+          </a:prstGeom>
+        </p:spPr>
+      </p:pic>
+      <p:sp>
+        <p:nvSpPr>
+          <p:cNvPr id="2" name="Title Placeholder 1"/>
+          <p:cNvSpPr>
+            <a:spLocks noGrp="1"/>
+          </p:cNvSpPr>
+          <p:nvPr>
+            <p:ph type="title"/>
+          </p:nvPr>
+        </p:nvSpPr>
+        <p:spPr>
+          <a:xfrm>
+            <a:off x="342900" y="206169"/>
+            <a:ext cx="6172200" cy="858044"/>
+          </a:xfrm>
+          <a:prstGeom prst="rect">
+            <a:avLst/>
+          </a:prstGeom>
+        </p:spPr>
+        <p:txBody>
+          <a:bodyPr vert="horz" lIns="68544" tIns="34272" rIns="68544" bIns="34272" rtlCol="0" anchor="ctr">
+            <a:normAutofit/>
+          </a:bodyPr>
+          <a:lstStyle/>
+          <a:p>
+            <a:r>
+              <a:rPr lang="x-none"/>
+              <a:t>Click to edit Master title style</a:t>
+            </a:r>
+            <a:endParaRPr lang="en-US"/>
+          </a:p>
+        </p:txBody>
+      </p:sp>
+      <p:sp>
+        <p:nvSpPr>
+          <p:cNvPr id="3" name="Text Placeholder 2"/>
+          <p:cNvSpPr>
+            <a:spLocks noGrp="1"/>
+          </p:cNvSpPr>
+          <p:nvPr>
+            <p:ph type="body" idx="1"/>
+          </p:nvPr>
+        </p:nvSpPr>
+        <p:spPr>
+          <a:xfrm>
+            <a:off x="342900" y="1201262"/>
+            <a:ext cx="6172200" cy="3397616"/>
+          </a:xfrm>
+          <a:prstGeom prst="rect">
+            <a:avLst/>
+          </a:prstGeom>
+        </p:spPr>
+        <p:txBody>
+          <a:bodyPr vert="horz" lIns="68544" tIns="34272" rIns="68544" bIns="34272" rtlCol="0">
+            <a:normAutofit/>
+          </a:bodyPr>
+          <a:lstStyle/>
+          <a:p>
+            <a:pPr lvl="0"/>
+            <a:r>
+              <a:rPr lang="x-none"/>
+              <a:t>Click to edit Master text styles</a:t>
+            </a:r>
+          </a:p>
+          <a:p>
+            <a:pPr lvl="1"/>
+            <a:r>
+              <a:rPr lang="x-none"/>
+              <a:t>Second level</a:t>
+            </a:r>
+          </a:p>
+          <a:p>
+            <a:pPr lvl="2"/>
+            <a:r>
+              <a:rPr lang="x-none"/>
+              <a:t>Third level</a:t>
+            </a:r>
+          </a:p>
+          <a:p>
+            <a:pPr lvl="3"/>
+            <a:r>
+              <a:rPr lang="x-none"/>
+              <a:t>Fourth level</a:t>
+            </a:r>
+          </a:p>
+          <a:p>
+            <a:pPr lvl="4"/>
+            <a:r>
+              <a:rPr lang="x-none"/>
+              <a:t>Fifth level</a:t>
+            </a:r>
+            <a:endParaRPr lang="en-US"/>
+          </a:p>
+        </p:txBody>
+      </p:sp>
+      <p:sp>
+        <p:nvSpPr>
+          <p:cNvPr id="4" name="Date Placeholder 3"/>
+          <p:cNvSpPr>
+            <a:spLocks noGrp="1"/>
+          </p:cNvSpPr>
+          <p:nvPr>
+            <p:ph type="dt" sz="half" idx="2"/>
+          </p:nvPr>
+        </p:nvSpPr>
+        <p:spPr>
+          <a:xfrm>
+            <a:off x="342900" y="4771684"/>
+            <a:ext cx="1600200" cy="274097"/>
+          </a:xfrm>
+          <a:prstGeom prst="rect">
+            <a:avLst/>
+          </a:prstGeom>
+        </p:spPr>
+        <p:txBody>
+          <a:bodyPr vert="horz" lIns="68544" tIns="34272" rIns="68544" bIns="34272" rtlCol="0" anchor="ctr"/>
+          <a:lstStyle>
+            <a:lvl1pPr algn="l">
+              <a:defRPr sz="900">
+                <a:solidFill>
+                  <a:schemeClr val="tx1">
+                    <a:tint val="75000"/>
+                  </a:schemeClr>
+                </a:solidFill>
+              </a:defRPr>
+            </a:lvl1pPr>
+          </a:lstStyle>
+          <a:p>
+            <a:fld id="{6B3695D4-C2E3-524A-A154-E6036064930E}" type="datetimeFigureOut">
+              <a:rPr lang="en-US" smtClean="0"/>
+              <a:t>8/6/2022</a:t>
+            </a:fld>
+            <a:endParaRPr lang="en-US"/>
+          </a:p>
+        </p:txBody>
+      </p:sp>
+      <p:sp>
+        <p:nvSpPr>
+          <p:cNvPr id="5" name="Footer Placeholder 4"/>
+          <p:cNvSpPr>
+            <a:spLocks noGrp="1"/>
+          </p:cNvSpPr>
+          <p:nvPr>
+            <p:ph type="ftr" sz="quarter" idx="3"/>
+          </p:nvPr>
+        </p:nvSpPr>
+        <p:spPr>
+          <a:xfrm>
+            <a:off x="2343150" y="4771684"/>
+            <a:ext cx="2171700" cy="274097"/>
+          </a:xfrm>
+          <a:prstGeom prst="rect">
+            <a:avLst/>
+          </a:prstGeom>
+        </p:spPr>
+        <p:txBody>
+          <a:bodyPr vert="horz" lIns="68544" tIns="34272" rIns="68544" bIns="34272" rtlCol="0" anchor="ctr"/>
+          <a:lstStyle>
+            <a:lvl1pPr algn="ctr">
+              <a:defRPr sz="900">
+                <a:solidFill>
+                  <a:schemeClr val="tx1">
+                    <a:tint val="75000"/>
+                  </a:schemeClr>
+                </a:solidFill>
+              </a:defRPr>
+            </a:lvl1pPr>
+          </a:lstStyle>
+          <a:p>
+            <a:endParaRPr lang="en-US"/>
+          </a:p>
+        </p:txBody>
+      </p:sp>
+      <p:sp>
+        <p:nvSpPr>
+          <p:cNvPr id="6" name="Slide Number Placeholder 5"/>
+          <p:cNvSpPr>
+            <a:spLocks noGrp="1"/>
+          </p:cNvSpPr>
+          <p:nvPr>
+            <p:ph type="sldNum" sz="quarter" idx="4"/>
+          </p:nvPr>
+        </p:nvSpPr>
+        <p:spPr>
+          <a:xfrm>
+            <a:off x="4914900" y="4771684"/>
+            <a:ext cx="1600200" cy="274097"/>
+          </a:xfrm>
+          <a:prstGeom prst="rect">
+            <a:avLst/>
+          </a:prstGeom>
+        </p:spPr>
+        <p:txBody>
+          <a:bodyPr vert="horz" lIns="68544" tIns="34272" rIns="68544" bIns="34272" rtlCol="0" anchor="ctr"/>
+          <a:lstStyle>
+            <a:lvl1pPr algn="r">
+              <a:defRPr sz="900">
+                <a:solidFill>
+                  <a:schemeClr val="tx1">
+                    <a:tint val="75000"/>
+                  </a:schemeClr>
+                </a:solidFill>
+              </a:defRPr>
+            </a:lvl1pPr>
+          </a:lstStyle>
+          <a:p>
+            <a:fld id="{495CFD00-10A0-8A42-BC0C-7FB4973ACCF2}" type="slidenum">
+              <a:rPr lang="en-US" smtClean="0"/>
+              <a:t>‹nº›</a:t>
+            </a:fld>
+            <a:endParaRPr lang="en-US"/>
+          </a:p>
+        </p:txBody>
+      </p:sp>
+      <p:pic>
+        <p:nvPicPr>
+          <p:cNvPr id="14" name="Picture 6" descr="fiap_elemento.png"/>
+          <p:cNvPicPr>
+            <a:picLocks noChangeAspect="1"/>
+          </p:cNvPicPr>
+          <p:nvPr userDrawn="1"/>
+        </p:nvPicPr>
+        <p:blipFill>
+          <a:blip r:embed="rId16">
+            <a:extLst>
+              <a:ext uri="{28A0092B-C50C-407E-A947-70E740481C1C}">
+                <a14:useLocalDpi xmlns:a14="http://schemas.microsoft.com/office/drawing/2010/main" val="0"/>
+              </a:ext>
+            </a:extLst>
+          </a:blip>
+          <a:stretch>
+            <a:fillRect/>
+          </a:stretch>
+        </p:blipFill>
+        <p:spPr>
+          <a:xfrm>
             <a:off x="-3181191" y="-379936"/>
             <a:ext cx="10040798" cy="5647950"/>
           </a:xfrm>
@@ -4309,7 +4310,7 @@
             <p:nvPr/>
           </p:nvPicPr>
           <p:blipFill>
-            <a:blip r:embed="rId16">
+            <a:blip r:embed="rId17">
               <a:extLst>
                 <a:ext uri="{28A0092B-C50C-407E-A947-70E740481C1C}">
                   <a14:useLocalDpi xmlns:a14="http://schemas.microsoft.com/office/drawing/2010/main" val="0"/>
@@ -4339,7 +4340,7 @@
             <p:nvPr/>
           </p:nvPicPr>
           <p:blipFill>
-            <a:blip r:embed="rId17">
+            <a:blip r:embed="rId18">
               <a:extLst>
                 <a:ext uri="{28A0092B-C50C-407E-A947-70E740481C1C}">
                   <a14:useLocalDpi xmlns:a14="http://schemas.microsoft.com/office/drawing/2010/main" val="0"/>
@@ -4695,11 +4696,6 @@
               </a:rPr>
               <a:t>TRABALHO 1</a:t>
             </a:r>
-            <a:endParaRPr lang="en-US" dirty="0">
-              <a:solidFill>
-                <a:schemeClr val="tx1"/>
-              </a:solidFill>
-            </a:endParaRPr>
           </a:p>
           <a:p>
             <a:pPr marL="0" indent="0">
@@ -4735,11 +4731,6 @@
               </a:rPr>
               <a:t>EQUIPE:</a:t>
             </a:r>
-            <a:endParaRPr lang="en-US" dirty="0">
-              <a:solidFill>
-                <a:schemeClr val="tx1"/>
-              </a:solidFill>
-            </a:endParaRPr>
           </a:p>
           <a:p>
             <a:pPr marL="0" indent="0">
@@ -4766,11 +4757,6 @@
               </a:rPr>
               <a:t>Ricardo Lacerda: RM343169</a:t>
             </a:r>
-            <a:endParaRPr lang="pt-BR" dirty="0">
-              <a:solidFill>
-                <a:srgbClr val="FF0000"/>
-              </a:solidFill>
-            </a:endParaRPr>
           </a:p>
           <a:p>
             <a:r>
@@ -4782,12 +4768,6 @@
               </a:rPr>
               <a:t>Gabriel Batalha: RM343023 </a:t>
             </a:r>
-            <a:endParaRPr lang="pt-BR" dirty="0">
-              <a:solidFill>
-                <a:srgbClr val="FF0000"/>
-              </a:solidFill>
-              <a:cs typeface="Calibri" panose="020F0502020204030204"/>
-            </a:endParaRPr>
           </a:p>
           <a:p>
             <a:r>
@@ -4799,12 +4779,6 @@
               </a:rPr>
               <a:t>Marcos Porto: RM343447</a:t>
             </a:r>
-            <a:endParaRPr lang="pt-BR" dirty="0">
-              <a:solidFill>
-                <a:srgbClr val="FF0000"/>
-              </a:solidFill>
-              <a:cs typeface="Calibri" panose="020F0502020204030204"/>
-            </a:endParaRPr>
           </a:p>
         </p:txBody>
       </p:sp>
@@ -4920,13 +4894,6 @@
               </a:rPr>
               <a:t>CONTEINERS E </a:t>
             </a:r>
-            <a:endParaRPr lang="en-US" sz="3500" dirty="0">
-              <a:solidFill>
-                <a:srgbClr val="626E73"/>
-              </a:solidFill>
-              <a:latin typeface="Gotham HTF Light"/>
-              <a:cs typeface="Gotham HTF Light"/>
-            </a:endParaRPr>
           </a:p>
           <a:p>
             <a:pPr algn="ctr"/>
@@ -4940,13 +4907,6 @@
               </a:rPr>
               <a:t>VIRTUALIZATION</a:t>
             </a:r>
-            <a:endParaRPr lang="en-US" sz="3500" dirty="0">
-              <a:solidFill>
-                <a:srgbClr val="626E73"/>
-              </a:solidFill>
-              <a:latin typeface="Gotham HTF Light"/>
-              <a:cs typeface="Gotham HTF Light"/>
-            </a:endParaRPr>
           </a:p>
         </p:txBody>
       </p:sp>
@@ -5209,7 +5169,6 @@
               <a:rPr lang="pt-BR" sz="2000" dirty="0"/>
               <a:t>TOPOLOGIA DA SOLUÇÃO:					3 PONTOS</a:t>
             </a:r>
-            <a:endParaRPr lang="pt-BR" sz="2000" dirty="0"/>
           </a:p>
           <a:p>
             <a:pPr marL="514350" indent="-514350" algn="l">
@@ -5243,7 +5202,6 @@
               <a:rPr lang="pt-BR" sz="2000" dirty="0"/>
               <a:t>CONFIGURAÇÃO DECLARATIVA (YML)		3 PONTOS</a:t>
             </a:r>
-            <a:endParaRPr lang="pt-BR" sz="2000" dirty="0"/>
           </a:p>
           <a:p>
             <a:pPr marL="514350" indent="-514350" algn="l">
@@ -5277,7 +5235,6 @@
               <a:rPr lang="pt-BR" sz="2000" dirty="0"/>
               <a:t>VÍDEO DEMONSTRATIVO DA SOLUÇÃO	2 PONTOS</a:t>
             </a:r>
-            <a:endParaRPr lang="pt-BR" sz="2000" dirty="0"/>
           </a:p>
         </p:txBody>
       </p:sp>
@@ -5314,13 +5271,6 @@
               </a:rPr>
               <a:t> INSTRUÇÕES</a:t>
             </a:r>
-            <a:endParaRPr lang="en-US" sz="3500" dirty="0">
-              <a:solidFill>
-                <a:srgbClr val="626E73"/>
-              </a:solidFill>
-              <a:latin typeface="Gotham HTF Light"/>
-              <a:cs typeface="Gotham HTF Light"/>
-            </a:endParaRPr>
           </a:p>
         </p:txBody>
       </p:sp>
@@ -5421,7 +5371,6 @@
               <a:rPr lang="pt-BR" sz="1400" dirty="0"/>
               <a:t>MICROSERVIÇO COM AÇÕES CRUD</a:t>
             </a:r>
-            <a:endParaRPr lang="pt-BR" sz="1400" dirty="0"/>
           </a:p>
           <a:p>
             <a:pPr marL="386080" indent="-386080" algn="l">
@@ -5453,11 +5402,6 @@
               </a:rPr>
               <a:t>USO DE BANCO DE DADOS</a:t>
             </a:r>
-            <a:endParaRPr lang="pt-BR" sz="1400" dirty="0">
-              <a:solidFill>
-                <a:schemeClr val="tx1"/>
-              </a:solidFill>
-            </a:endParaRPr>
           </a:p>
           <a:p>
             <a:pPr marL="386080" indent="-386080" algn="l">
@@ -5481,7 +5425,6 @@
               <a:rPr lang="pt-BR" sz="1400" dirty="0"/>
               <a:t>COMUNICAÇÃO SINCRONA API COM SWAGGER	</a:t>
             </a:r>
-            <a:endParaRPr lang="pt-BR" sz="1400" dirty="0"/>
           </a:p>
           <a:p>
             <a:pPr marL="386080" indent="-386080" algn="l">
@@ -5505,7 +5448,6 @@
               <a:rPr lang="pt-BR" sz="1400" dirty="0"/>
               <a:t>COMUNICAÇÃO ASSINCRONA EVENTOS		</a:t>
             </a:r>
-            <a:endParaRPr lang="pt-BR" sz="1400" dirty="0"/>
           </a:p>
           <a:p>
             <a:pPr marL="386080" indent="-386080" algn="l">
@@ -5529,7 +5471,6 @@
               <a:rPr lang="pt-BR" sz="1400" dirty="0"/>
               <a:t>FRONT END 					</a:t>
             </a:r>
-            <a:endParaRPr lang="pt-BR" sz="1400" dirty="0"/>
           </a:p>
           <a:p>
             <a:pPr marL="386080" indent="-386080" algn="l">
@@ -5557,7 +5498,6 @@
               <a:rPr lang="pt-BR" sz="1200" dirty="0"/>
               <a:t>				</a:t>
             </a:r>
-            <a:endParaRPr lang="pt-BR" sz="1200" dirty="0"/>
           </a:p>
           <a:p>
             <a:pPr marL="386080" indent="-386080" algn="l">
@@ -5630,12 +5570,6 @@
               </a:rPr>
               <a:t>ESCOLHER NO MÍNIMO 2 requisitos da aplicação </a:t>
             </a:r>
-            <a:endParaRPr lang="pt-BR" sz="1500" b="1" cap="all" dirty="0">
-              <a:solidFill>
-                <a:srgbClr val="FF6801"/>
-              </a:solidFill>
-              <a:latin typeface="HelveticaNeue-Condensed"/>
-            </a:endParaRPr>
           </a:p>
           <a:p>
             <a:pPr algn="ctr"/>
@@ -5707,13 +5641,6 @@
               </a:rPr>
               <a:t> INSTRUÇÕES</a:t>
             </a:r>
-            <a:endParaRPr lang="en-US" sz="3500" dirty="0">
-              <a:solidFill>
-                <a:srgbClr val="626E73"/>
-              </a:solidFill>
-              <a:latin typeface="Gotham HTF Light"/>
-              <a:cs typeface="Gotham HTF Light"/>
-            </a:endParaRPr>
           </a:p>
         </p:txBody>
       </p:sp>
@@ -5786,6 +5713,7 @@
         </p:style>
         <p:txBody>
           <a:bodyPr rtlCol="0" anchor="ctr"/>
+          <a:lstStyle/>
           <a:p>
             <a:pPr algn="ctr"/>
             <a:endParaRPr lang="pt-BR"/>
@@ -5823,6 +5751,7 @@
         </p:style>
         <p:txBody>
           <a:bodyPr rtlCol="0" anchor="ctr"/>
+          <a:lstStyle/>
           <a:p>
             <a:pPr algn="ctr"/>
             <a:endParaRPr lang="pt-BR"/>
@@ -6222,13 +6151,6 @@
               </a:rPr>
               <a:t>1 – TOPOLOGIA DA SOLUÇÃO</a:t>
             </a:r>
-            <a:endParaRPr lang="pt-BR" sz="2400" dirty="0">
-              <a:solidFill>
-                <a:srgbClr val="626E73"/>
-              </a:solidFill>
-              <a:latin typeface="Gotham HTF Light"/>
-              <a:ea typeface="+mn-ea"/>
-            </a:endParaRPr>
           </a:p>
         </p:txBody>
       </p:sp>
@@ -6291,7 +6213,7 @@
             <p:nvPr/>
           </p:nvPicPr>
           <p:blipFill>
-            <a:blip r:embed="rId1">
+            <a:blip r:embed="rId2">
               <a:extLst>
                 <a:ext uri="{28A0092B-C50C-407E-A947-70E740481C1C}">
                   <a14:useLocalDpi xmlns:a14="http://schemas.microsoft.com/office/drawing/2010/main" val="0"/>
@@ -6321,7 +6243,7 @@
             <p:nvPr/>
           </p:nvPicPr>
           <p:blipFill>
-            <a:blip r:embed="rId2">
+            <a:blip r:embed="rId3">
               <a:extLst>
                 <a:ext uri="{28A0092B-C50C-407E-A947-70E740481C1C}">
                   <a14:useLocalDpi xmlns:a14="http://schemas.microsoft.com/office/drawing/2010/main" val="0"/>
@@ -6396,78 +6318,106 @@
               </a:rPr>
               <a:t>CONTEINERS? ALTA DISPONIBILIDADE? )</a:t>
             </a:r>
-            <a:endParaRPr lang="pt-BR" b="1" dirty="0">
+          </a:p>
+        </p:txBody>
+      </p:sp>
+      <p:sp>
+        <p:nvSpPr>
+          <p:cNvPr id="7" name="Retângulo 6"/>
+          <p:cNvSpPr/>
+          <p:nvPr/>
+        </p:nvSpPr>
+        <p:spPr>
+          <a:xfrm>
+            <a:off x="1875865" y="4264172"/>
+            <a:ext cx="3429000" cy="246221"/>
+          </a:xfrm>
+          <a:prstGeom prst="rect">
+            <a:avLst/>
+          </a:prstGeom>
+        </p:spPr>
+        <p:txBody>
+          <a:bodyPr>
+            <a:spAutoFit/>
+          </a:bodyPr>
+          <a:lstStyle/>
+          <a:p>
+            <a:pPr algn="ctr"/>
+            <a:r>
+              <a:rPr lang="pt-BR" sz="1000" i="1" dirty="0" smtClean="0">
+                <a:solidFill>
+                  <a:srgbClr val="1D1C1D"/>
+                </a:solidFill>
+                <a:latin typeface="Slack-Lato"/>
+              </a:rPr>
+              <a:t>Topologia Estrutural Back-</a:t>
+            </a:r>
+            <a:r>
+              <a:rPr lang="pt-BR" sz="1000" i="1" dirty="0" err="1" smtClean="0">
+                <a:solidFill>
+                  <a:srgbClr val="1D1C1D"/>
+                </a:solidFill>
+                <a:latin typeface="Slack-Lato"/>
+              </a:rPr>
+              <a:t>End</a:t>
+            </a:r>
+            <a:r>
+              <a:rPr lang="pt-BR" sz="1000" i="1" dirty="0" smtClean="0">
+                <a:solidFill>
+                  <a:srgbClr val="1D1C1D"/>
+                </a:solidFill>
+                <a:latin typeface="Slack-Lato"/>
+              </a:rPr>
+              <a:t> Monitoramento </a:t>
+            </a:r>
+            <a:r>
+              <a:rPr lang="pt-BR" sz="1000" i="1" dirty="0" err="1" smtClean="0">
+                <a:solidFill>
+                  <a:srgbClr val="1D1C1D"/>
+                </a:solidFill>
+                <a:latin typeface="Slack-Lato"/>
+              </a:rPr>
+              <a:t>Drone</a:t>
+            </a:r>
+            <a:endParaRPr lang="pt-BR" sz="1000" i="1" dirty="0">
               <a:solidFill>
-                <a:srgbClr val="FF0000"/>
+                <a:srgbClr val="1D1C1D"/>
               </a:solidFill>
+              <a:latin typeface="Slack-Lato"/>
             </a:endParaRPr>
           </a:p>
         </p:txBody>
       </p:sp>
       <p:pic>
         <p:nvPicPr>
-          <p:cNvPr id="6" name="Imagem 5" descr="Uma imagem contendo screenshot, texto, monitor, computador&#10;&#10;Descrição gerada automaticamente"/>
+          <p:cNvPr id="2" name="Imagem 1"/>
           <p:cNvPicPr>
             <a:picLocks noChangeAspect="1"/>
           </p:cNvPicPr>
           <p:nvPr/>
         </p:nvPicPr>
         <p:blipFill>
-          <a:blip r:embed="rId3"/>
+          <a:blip r:embed="rId4">
+            <a:extLst>
+              <a:ext uri="{28A0092B-C50C-407E-A947-70E740481C1C}">
+                <a14:useLocalDpi xmlns:a14="http://schemas.microsoft.com/office/drawing/2010/main" val="0"/>
+              </a:ext>
+            </a:extLst>
+          </a:blip>
           <a:stretch>
             <a:fillRect/>
           </a:stretch>
         </p:blipFill>
         <p:spPr>
           <a:xfrm>
-            <a:off x="558800" y="1876378"/>
-            <a:ext cx="5740400" cy="2184400"/>
+            <a:off x="995362" y="1407311"/>
+            <a:ext cx="5457825" cy="2936613"/>
           </a:xfrm>
           <a:prstGeom prst="rect">
             <a:avLst/>
           </a:prstGeom>
         </p:spPr>
       </p:pic>
-      <p:sp>
-        <p:nvSpPr>
-          <p:cNvPr id="7" name="Retângulo 6"/>
-          <p:cNvSpPr/>
-          <p:nvPr/>
-        </p:nvSpPr>
-        <p:spPr>
-          <a:xfrm>
-            <a:off x="1875865" y="4264172"/>
-            <a:ext cx="3429000" cy="246221"/>
-          </a:xfrm>
-          <a:prstGeom prst="rect">
-            <a:avLst/>
-          </a:prstGeom>
-        </p:spPr>
-        <p:txBody>
-          <a:bodyPr>
-            <a:spAutoFit/>
-          </a:bodyPr>
-          <a:lstStyle/>
-          <a:p>
-            <a:pPr algn="ctr"/>
-            <a:r>
-              <a:rPr lang="pt-BR" sz="1000" i="1" dirty="0">
-                <a:solidFill>
-                  <a:srgbClr val="1D1C1D"/>
-                </a:solidFill>
-                <a:latin typeface="Slack-Lato"/>
-              </a:rPr>
-              <a:t>Exemplo de topologia que outra turma montou.</a:t>
-            </a:r>
-            <a:endParaRPr lang="pt-BR" sz="1000" i="1" dirty="0">
-              <a:solidFill>
-                <a:srgbClr val="1D1C1D"/>
-              </a:solidFill>
-              <a:latin typeface="Slack-Lato"/>
-            </a:endParaRPr>
-          </a:p>
-        </p:txBody>
-      </p:sp>
     </p:spTree>
   </p:cSld>
   <p:clrMapOvr>
@@ -6789,12 +6739,6 @@
               </a:rPr>
               <a:t>)</a:t>
             </a:r>
-            <a:endParaRPr lang="pt-BR" sz="2400" dirty="0">
-              <a:solidFill>
-                <a:srgbClr val="626E73"/>
-              </a:solidFill>
-              <a:latin typeface="Gotham HTF Light"/>
-            </a:endParaRPr>
           </a:p>
         </p:txBody>
       </p:sp>
@@ -6857,7 +6801,7 @@
             <p:nvPr/>
           </p:nvPicPr>
           <p:blipFill>
-            <a:blip r:embed="rId1">
+            <a:blip r:embed="rId3">
               <a:extLst>
                 <a:ext uri="{28A0092B-C50C-407E-A947-70E740481C1C}">
                   <a14:useLocalDpi xmlns:a14="http://schemas.microsoft.com/office/drawing/2010/main" val="0"/>
@@ -6887,7 +6831,7 @@
             <p:nvPr/>
           </p:nvPicPr>
           <p:blipFill>
-            <a:blip r:embed="rId2">
+            <a:blip r:embed="rId4">
               <a:extLst>
                 <a:ext uri="{28A0092B-C50C-407E-A947-70E740481C1C}">
                   <a14:useLocalDpi xmlns:a14="http://schemas.microsoft.com/office/drawing/2010/main" val="0"/>
@@ -6953,14 +6897,6 @@
               </a:rPr>
               <a:t>ARQUIVOS YML : AUXILIAM NA DEFINIÇÃO DE INFRA AS CODE</a:t>
             </a:r>
-            <a:endParaRPr lang="pt-BR" b="1" dirty="0">
-              <a:solidFill>
-                <a:schemeClr val="tx1">
-                  <a:lumMod val="65000"/>
-                  <a:lumOff val="35000"/>
-                </a:schemeClr>
-              </a:solidFill>
-            </a:endParaRPr>
           </a:p>
         </p:txBody>
       </p:sp>
@@ -6983,8 +6919,20 @@
                 <a:tableStyleId>{5C22544A-7EE6-4342-B048-85BDC9FD1C3A}</a:tableStyleId>
               </a:tblPr>
               <a:tblGrid>
-                <a:gridCol w="2863964"/>
-                <a:gridCol w="2863964"/>
+                <a:gridCol w="2863964">
+                  <a:extLst>
+                    <a:ext uri="{9D8B030D-6E8A-4147-A177-3AD203B41FA5}">
+                      <a16:colId xmlns:a16="http://schemas.microsoft.com/office/drawing/2014/main" val="20000"/>
+                    </a:ext>
+                  </a:extLst>
+                </a:gridCol>
+                <a:gridCol w="2863964">
+                  <a:extLst>
+                    <a:ext uri="{9D8B030D-6E8A-4147-A177-3AD203B41FA5}">
+                      <a16:colId xmlns:a16="http://schemas.microsoft.com/office/drawing/2014/main" val="20001"/>
+                    </a:ext>
+                  </a:extLst>
+                </a:gridCol>
               </a:tblGrid>
               <a:tr h="662940">
                 <a:tc>
@@ -7004,7 +6952,6 @@
                         <a:rPr lang="pt-BR" sz="1800" dirty="0"/>
                         <a:t> ( GITHUB )</a:t>
                       </a:r>
-                      <a:endParaRPr lang="pt-BR" sz="1800" dirty="0"/>
                     </a:p>
                     <a:p>
                       <a:endParaRPr lang="pt-BR" sz="2100" dirty="0"/>
@@ -7021,11 +6968,15 @@
                         <a:rPr lang="pt-BR" sz="1800" dirty="0"/>
                         <a:t>LINK  ( IMAGEM DOCKER )</a:t>
                       </a:r>
-                      <a:endParaRPr lang="pt-BR" sz="1800" dirty="0"/>
                     </a:p>
                   </a:txBody>
                   <a:tcPr marL="68580" marR="68580" marT="34290" marB="34290"/>
                 </a:tc>
+                <a:extLst>
+                  <a:ext uri="{0D108BD9-81ED-4DB2-BD59-A6C34878D82A}">
+                    <a16:rowId xmlns:a16="http://schemas.microsoft.com/office/drawing/2014/main" val="10000"/>
+                  </a:ext>
+                </a:extLst>
               </a:tr>
               <a:tr h="675653">
                 <a:tc>
@@ -7088,6 +7039,11 @@
                   </a:txBody>
                   <a:tcPr marL="68580" marR="68580" marT="34290" marB="34290"/>
                 </a:tc>
+                <a:extLst>
+                  <a:ext uri="{0D108BD9-81ED-4DB2-BD59-A6C34878D82A}">
+                    <a16:rowId xmlns:a16="http://schemas.microsoft.com/office/drawing/2014/main" val="10001"/>
+                  </a:ext>
+                </a:extLst>
               </a:tr>
             </a:tbl>
           </a:graphicData>
@@ -7099,11 +7055,17 @@
           <p:cNvGraphicFramePr>
             <a:graphicFrameLocks noGrp="1"/>
           </p:cNvGraphicFramePr>
-          <p:nvPr/>
+          <p:nvPr>
+            <p:extLst>
+              <p:ext uri="{D42A27DB-BD31-4B8C-83A1-F6EECF244321}">
+                <p14:modId xmlns:p14="http://schemas.microsoft.com/office/powerpoint/2010/main" val="1192739472"/>
+              </p:ext>
+            </p:extLst>
+          </p:nvPr>
         </p:nvGraphicFramePr>
         <p:xfrm>
           <a:off x="206872" y="1394941"/>
-          <a:ext cx="6444256" cy="1102360"/>
+          <a:ext cx="6444256" cy="4302760"/>
         </p:xfrm>
         <a:graphic>
           <a:graphicData uri="http://schemas.openxmlformats.org/drawingml/2006/table">
@@ -7112,8 +7074,20 @@
                 <a:tableStyleId>{5C22544A-7EE6-4342-B048-85BDC9FD1C3A}</a:tableStyleId>
               </a:tblPr>
               <a:tblGrid>
-                <a:gridCol w="3222128"/>
-                <a:gridCol w="3222128"/>
+                <a:gridCol w="3222128">
+                  <a:extLst>
+                    <a:ext uri="{9D8B030D-6E8A-4147-A177-3AD203B41FA5}">
+                      <a16:colId xmlns:a16="http://schemas.microsoft.com/office/drawing/2014/main" val="20000"/>
+                    </a:ext>
+                  </a:extLst>
+                </a:gridCol>
+                <a:gridCol w="3222128">
+                  <a:extLst>
+                    <a:ext uri="{9D8B030D-6E8A-4147-A177-3AD203B41FA5}">
+                      <a16:colId xmlns:a16="http://schemas.microsoft.com/office/drawing/2014/main" val="20001"/>
+                    </a:ext>
+                  </a:extLst>
+                </a:gridCol>
               </a:tblGrid>
               <a:tr h="370840">
                 <a:tc>
@@ -7126,7 +7100,6 @@
                         <a:rPr lang="pt-BR" dirty="0"/>
                         <a:t>REQUISITOS</a:t>
                       </a:r>
-                      <a:endParaRPr lang="pt-BR" dirty="0"/>
                     </a:p>
                   </a:txBody>
                   <a:tcPr/>
@@ -7141,11 +7114,15 @@
                         <a:rPr lang="pt-BR" dirty="0"/>
                         <a:t>AMBIENTE ALTA DISPONIBILIDADE</a:t>
                       </a:r>
-                      <a:endParaRPr lang="pt-BR" dirty="0"/>
                     </a:p>
                   </a:txBody>
                   <a:tcPr/>
                 </a:tc>
+                <a:extLst>
+                  <a:ext uri="{0D108BD9-81ED-4DB2-BD59-A6C34878D82A}">
+                    <a16:rowId xmlns:a16="http://schemas.microsoft.com/office/drawing/2014/main" val="10000"/>
+                  </a:ext>
+                </a:extLst>
               </a:tr>
               <a:tr h="370840">
                 <a:tc>
@@ -7158,7 +7135,6 @@
                         <a:rPr lang="pt-BR" dirty="0"/>
                         <a:t>SOLUÇÃO ESCOLHIDA:</a:t>
                       </a:r>
-                      <a:endParaRPr lang="pt-BR" dirty="0"/>
                     </a:p>
                     <a:p>
                       <a:pPr algn="ctr"/>
@@ -7166,7 +7142,6 @@
                         <a:rPr lang="pt-BR" dirty="0"/>
                         <a:t>- Docker</a:t>
                       </a:r>
-                      <a:endParaRPr lang="pt-BR" dirty="0"/>
                     </a:p>
                     <a:p>
                       <a:pPr algn="ctr"/>
@@ -7174,7 +7149,6 @@
                         <a:rPr lang="pt-BR" dirty="0"/>
                         <a:t>- Spring Boot</a:t>
                       </a:r>
-                      <a:endParaRPr lang="pt-BR" dirty="0"/>
                     </a:p>
                     <a:p>
                       <a:pPr algn="ctr"/>
@@ -7182,7 +7156,6 @@
                         <a:rPr lang="pt-BR" dirty="0"/>
                         <a:t>- Spring Kafka</a:t>
                       </a:r>
-                      <a:endParaRPr lang="pt-BR" dirty="0"/>
                     </a:p>
                     <a:p>
                       <a:pPr algn="ctr"/>
@@ -7190,7 +7163,6 @@
                         <a:rPr lang="pt-BR" dirty="0"/>
                         <a:t>- Spring Data Mongo</a:t>
                       </a:r>
-                      <a:endParaRPr lang="pt-BR" dirty="0"/>
                     </a:p>
                     <a:p>
                       <a:pPr algn="ctr"/>
@@ -7198,7 +7170,6 @@
                         <a:rPr lang="pt-BR" dirty="0"/>
                         <a:t>- Spring RestTemplate</a:t>
                       </a:r>
-                      <a:endParaRPr lang="pt-BR" dirty="0"/>
                     </a:p>
                     <a:p>
                       <a:pPr algn="ctr"/>
@@ -7206,7 +7177,6 @@
                         <a:rPr lang="pt-BR" dirty="0"/>
                         <a:t>- Spring Freemaker</a:t>
                       </a:r>
-                      <a:endParaRPr lang="pt-BR" dirty="0"/>
                     </a:p>
                     <a:p>
                       <a:pPr algn="ctr"/>
@@ -7214,7 +7184,6 @@
                         <a:rPr lang="pt-BR" dirty="0"/>
                         <a:t>- Lombok</a:t>
                       </a:r>
-                      <a:endParaRPr lang="pt-BR" dirty="0"/>
                     </a:p>
                     <a:p>
                       <a:pPr algn="ctr"/>
@@ -7222,7 +7191,6 @@
                         <a:rPr lang="pt-BR" dirty="0"/>
                         <a:t>- Java 11</a:t>
                       </a:r>
-                      <a:endParaRPr lang="pt-BR" dirty="0"/>
                     </a:p>
                     <a:p>
                       <a:pPr algn="ctr"/>
@@ -7230,7 +7198,6 @@
                         <a:rPr lang="pt-BR" dirty="0"/>
                         <a:t>- Gradle</a:t>
                       </a:r>
-                      <a:endParaRPr lang="pt-BR" dirty="0"/>
                     </a:p>
                     <a:p>
                       <a:pPr algn="ctr"/>
@@ -7238,7 +7205,6 @@
                         <a:rPr lang="pt-BR" dirty="0"/>
                         <a:t>- Kafka</a:t>
                       </a:r>
-                      <a:endParaRPr lang="pt-BR" dirty="0"/>
                     </a:p>
                     <a:p>
                       <a:pPr algn="ctr"/>
@@ -7246,7 +7212,6 @@
                         <a:rPr lang="pt-BR" dirty="0"/>
                         <a:t>- Job Scheduled</a:t>
                       </a:r>
-                      <a:endParaRPr lang="pt-BR" dirty="0"/>
                     </a:p>
                     <a:p>
                       <a:pPr algn="ctr"/>
@@ -7254,7 +7219,6 @@
                         <a:rPr lang="pt-BR" dirty="0"/>
                         <a:t>- JavaMail</a:t>
                       </a:r>
-                      <a:endParaRPr lang="pt-BR" dirty="0"/>
                     </a:p>
                     <a:p>
                       <a:pPr algn="ctr"/>
@@ -7262,7 +7226,6 @@
                         <a:rPr lang="pt-BR" dirty="0"/>
                         <a:t>- MongoDB</a:t>
                       </a:r>
-                      <a:endParaRPr lang="pt-BR" dirty="0"/>
                     </a:p>
                     <a:p>
                       <a:pPr algn="ctr"/>
@@ -7270,7 +7233,6 @@
                         <a:rPr lang="pt-BR" dirty="0"/>
                         <a:t>- Mongo Express</a:t>
                       </a:r>
-                      <a:endParaRPr lang="pt-BR" dirty="0"/>
                     </a:p>
                     <a:p>
                       <a:pPr algn="ctr"/>
@@ -7278,7 +7240,6 @@
                         <a:rPr lang="pt-BR" dirty="0"/>
                         <a:t>- Swagger 3.0</a:t>
                       </a:r>
-                      <a:endParaRPr lang="pt-BR" dirty="0"/>
                     </a:p>
                     <a:p>
                       <a:pPr algn="ctr"/>
@@ -7286,7 +7247,6 @@
                         <a:rPr lang="pt-BR" dirty="0"/>
                         <a:t>- Kowl</a:t>
                       </a:r>
-                      <a:endParaRPr lang="pt-BR" dirty="0"/>
                     </a:p>
                     <a:p>
                       <a:pPr algn="ctr"/>
@@ -7294,7 +7254,6 @@
                         <a:rPr lang="pt-BR" dirty="0"/>
                         <a:t>- Gson</a:t>
                       </a:r>
-                      <a:endParaRPr lang="pt-BR" dirty="0"/>
                     </a:p>
                   </a:txBody>
                   <a:tcPr/>
@@ -7314,14 +7273,30 @@
                         <a:t>- Cluster </a:t>
                       </a:r>
                       <a:r>
-                        <a:rPr lang="pt-BR" b="1" dirty="0" err="1">
+                        <a:rPr lang="pt-BR" b="1" dirty="0" err="1" smtClean="0">
+                          <a:solidFill>
+                            <a:srgbClr val="FF0000"/>
+                          </a:solidFill>
+                        </a:rPr>
+                        <a:t>Docker</a:t>
+                      </a:r>
+                      <a:r>
+                        <a:rPr lang="pt-BR" b="1" dirty="0" smtClean="0">
+                          <a:solidFill>
+                            <a:srgbClr val="FF0000"/>
+                          </a:solidFill>
+                        </a:rPr>
+                        <a:t> </a:t>
+                      </a:r>
+                      <a:r>
+                        <a:rPr lang="pt-BR" b="1" dirty="0" err="1" smtClean="0">
                           <a:solidFill>
                             <a:srgbClr val="FF0000"/>
                           </a:solidFill>
                         </a:rPr>
                         <a:t>Swarm</a:t>
                       </a:r>
-                      <a:endParaRPr lang="pt-BR" b="1" dirty="0" err="1">
+                      <a:endParaRPr lang="pt-BR" b="1" dirty="0">
                         <a:solidFill>
                           <a:srgbClr val="FF0000"/>
                         </a:solidFill>
@@ -7342,8 +7317,355 @@
                   </a:txBody>
                   <a:tcPr/>
                 </a:tc>
+                <a:extLst>
+                  <a:ext uri="{0D108BD9-81ED-4DB2-BD59-A6C34878D82A}">
+                    <a16:rowId xmlns:a16="http://schemas.microsoft.com/office/drawing/2014/main" val="10001"/>
+                  </a:ext>
+                </a:extLst>
               </a:tr>
             </a:tbl>
+          </a:graphicData>
+        </a:graphic>
+      </p:graphicFrame>
+      <p:graphicFrame>
+        <p:nvGraphicFramePr>
+          <p:cNvPr id="2" name="Objeto 1"/>
+          <p:cNvGraphicFramePr>
+            <a:graphicFrameLocks noChangeAspect="1"/>
+          </p:cNvGraphicFramePr>
+          <p:nvPr>
+            <p:extLst>
+              <p:ext uri="{D42A27DB-BD31-4B8C-83A1-F6EECF244321}">
+                <p14:modId xmlns:p14="http://schemas.microsoft.com/office/powerpoint/2010/main" val="2483981322"/>
+              </p:ext>
+            </p:extLst>
+          </p:nvPr>
+        </p:nvGraphicFramePr>
+        <p:xfrm>
+          <a:off x="3497580" y="2374048"/>
+          <a:ext cx="1392238" cy="438150"/>
+        </p:xfrm>
+        <a:graphic>
+          <a:graphicData uri="http://schemas.openxmlformats.org/presentationml/2006/ole">
+            <mc:AlternateContent xmlns:mc="http://schemas.openxmlformats.org/markup-compatibility/2006">
+              <mc:Choice xmlns:v="urn:schemas-microsoft-com:vml" Requires="v">
+                <p:oleObj spid="_x0000_s1026" name="Objeto de Shell de Gerenciador" showAsIcon="1" r:id="rId5" imgW="1392480" imgH="437760" progId="Package">
+                  <p:embed/>
+                </p:oleObj>
+              </mc:Choice>
+              <mc:Fallback>
+                <p:oleObj name="Objeto de Shell de Gerenciador" showAsIcon="1" r:id="rId5" imgW="1392480" imgH="437760" progId="Package">
+                  <p:embed/>
+                  <p:pic>
+                    <p:nvPicPr>
+                      <p:cNvPr id="0" name=""/>
+                      <p:cNvPicPr/>
+                      <p:nvPr/>
+                    </p:nvPicPr>
+                    <p:blipFill>
+                      <a:blip r:embed="rId6"/>
+                      <a:stretch>
+                        <a:fillRect/>
+                      </a:stretch>
+                    </p:blipFill>
+                    <p:spPr>
+                      <a:xfrm>
+                        <a:off x="3497580" y="2374048"/>
+                        <a:ext cx="1392238" cy="438150"/>
+                      </a:xfrm>
+                      <a:prstGeom prst="rect">
+                        <a:avLst/>
+                      </a:prstGeom>
+                    </p:spPr>
+                  </p:pic>
+                </p:oleObj>
+              </mc:Fallback>
+            </mc:AlternateContent>
+          </a:graphicData>
+        </a:graphic>
+      </p:graphicFrame>
+      <p:graphicFrame>
+        <p:nvGraphicFramePr>
+          <p:cNvPr id="3" name="Objeto 2"/>
+          <p:cNvGraphicFramePr>
+            <a:graphicFrameLocks noChangeAspect="1"/>
+          </p:cNvGraphicFramePr>
+          <p:nvPr>
+            <p:extLst>
+              <p:ext uri="{D42A27DB-BD31-4B8C-83A1-F6EECF244321}">
+                <p14:modId xmlns:p14="http://schemas.microsoft.com/office/powerpoint/2010/main" val="2224226306"/>
+              </p:ext>
+            </p:extLst>
+          </p:nvPr>
+        </p:nvGraphicFramePr>
+        <p:xfrm>
+          <a:off x="3534093" y="2913734"/>
+          <a:ext cx="1319212" cy="438150"/>
+        </p:xfrm>
+        <a:graphic>
+          <a:graphicData uri="http://schemas.openxmlformats.org/presentationml/2006/ole">
+            <mc:AlternateContent xmlns:mc="http://schemas.openxmlformats.org/markup-compatibility/2006">
+              <mc:Choice xmlns:v="urn:schemas-microsoft-com:vml" Requires="v">
+                <p:oleObj spid="_x0000_s1027" name="Objeto de Shell de Gerenciador" showAsIcon="1" r:id="rId7" imgW="1319400" imgH="437760" progId="Package">
+                  <p:embed/>
+                </p:oleObj>
+              </mc:Choice>
+              <mc:Fallback>
+                <p:oleObj name="Objeto de Shell de Gerenciador" showAsIcon="1" r:id="rId7" imgW="1319400" imgH="437760" progId="Package">
+                  <p:embed/>
+                  <p:pic>
+                    <p:nvPicPr>
+                      <p:cNvPr id="0" name=""/>
+                      <p:cNvPicPr/>
+                      <p:nvPr/>
+                    </p:nvPicPr>
+                    <p:blipFill>
+                      <a:blip r:embed="rId8"/>
+                      <a:stretch>
+                        <a:fillRect/>
+                      </a:stretch>
+                    </p:blipFill>
+                    <p:spPr>
+                      <a:xfrm>
+                        <a:off x="3534093" y="2913734"/>
+                        <a:ext cx="1319212" cy="438150"/>
+                      </a:xfrm>
+                      <a:prstGeom prst="rect">
+                        <a:avLst/>
+                      </a:prstGeom>
+                    </p:spPr>
+                  </p:pic>
+                </p:oleObj>
+              </mc:Fallback>
+            </mc:AlternateContent>
+          </a:graphicData>
+        </a:graphic>
+      </p:graphicFrame>
+      <p:graphicFrame>
+        <p:nvGraphicFramePr>
+          <p:cNvPr id="4" name="Objeto 3"/>
+          <p:cNvGraphicFramePr>
+            <a:graphicFrameLocks noChangeAspect="1"/>
+          </p:cNvGraphicFramePr>
+          <p:nvPr>
+            <p:extLst>
+              <p:ext uri="{D42A27DB-BD31-4B8C-83A1-F6EECF244321}">
+                <p14:modId xmlns:p14="http://schemas.microsoft.com/office/powerpoint/2010/main" val="1944390695"/>
+              </p:ext>
+            </p:extLst>
+          </p:nvPr>
+        </p:nvGraphicFramePr>
+        <p:xfrm>
+          <a:off x="3419793" y="3485596"/>
+          <a:ext cx="1547812" cy="438150"/>
+        </p:xfrm>
+        <a:graphic>
+          <a:graphicData uri="http://schemas.openxmlformats.org/presentationml/2006/ole">
+            <mc:AlternateContent xmlns:mc="http://schemas.openxmlformats.org/markup-compatibility/2006">
+              <mc:Choice xmlns:v="urn:schemas-microsoft-com:vml" Requires="v">
+                <p:oleObj spid="_x0000_s1028" name="Objeto de Shell de Gerenciador" showAsIcon="1" r:id="rId9" imgW="1547280" imgH="437760" progId="Package">
+                  <p:embed/>
+                </p:oleObj>
+              </mc:Choice>
+              <mc:Fallback>
+                <p:oleObj name="Objeto de Shell de Gerenciador" showAsIcon="1" r:id="rId9" imgW="1547280" imgH="437760" progId="Package">
+                  <p:embed/>
+                  <p:pic>
+                    <p:nvPicPr>
+                      <p:cNvPr id="0" name=""/>
+                      <p:cNvPicPr/>
+                      <p:nvPr/>
+                    </p:nvPicPr>
+                    <p:blipFill>
+                      <a:blip r:embed="rId10"/>
+                      <a:stretch>
+                        <a:fillRect/>
+                      </a:stretch>
+                    </p:blipFill>
+                    <p:spPr>
+                      <a:xfrm>
+                        <a:off x="3419793" y="3485596"/>
+                        <a:ext cx="1547812" cy="438150"/>
+                      </a:xfrm>
+                      <a:prstGeom prst="rect">
+                        <a:avLst/>
+                      </a:prstGeom>
+                    </p:spPr>
+                  </p:pic>
+                </p:oleObj>
+              </mc:Fallback>
+            </mc:AlternateContent>
+          </a:graphicData>
+        </a:graphic>
+      </p:graphicFrame>
+      <p:graphicFrame>
+        <p:nvGraphicFramePr>
+          <p:cNvPr id="5" name="Objeto 4"/>
+          <p:cNvGraphicFramePr>
+            <a:graphicFrameLocks noChangeAspect="1"/>
+          </p:cNvGraphicFramePr>
+          <p:nvPr>
+            <p:extLst>
+              <p:ext uri="{D42A27DB-BD31-4B8C-83A1-F6EECF244321}">
+                <p14:modId xmlns:p14="http://schemas.microsoft.com/office/powerpoint/2010/main" val="3438327131"/>
+              </p:ext>
+            </p:extLst>
+          </p:nvPr>
+        </p:nvGraphicFramePr>
+        <p:xfrm>
+          <a:off x="3717449" y="4057458"/>
+          <a:ext cx="952500" cy="438150"/>
+        </p:xfrm>
+        <a:graphic>
+          <a:graphicData uri="http://schemas.openxmlformats.org/presentationml/2006/ole">
+            <mc:AlternateContent xmlns:mc="http://schemas.openxmlformats.org/markup-compatibility/2006">
+              <mc:Choice xmlns:v="urn:schemas-microsoft-com:vml" Requires="v">
+                <p:oleObj spid="_x0000_s1029" name="Objeto de Shell de Gerenciador" showAsIcon="1" r:id="rId11" imgW="952920" imgH="437760" progId="Package">
+                  <p:embed/>
+                </p:oleObj>
+              </mc:Choice>
+              <mc:Fallback>
+                <p:oleObj name="Objeto de Shell de Gerenciador" showAsIcon="1" r:id="rId11" imgW="952920" imgH="437760" progId="Package">
+                  <p:embed/>
+                  <p:pic>
+                    <p:nvPicPr>
+                      <p:cNvPr id="0" name=""/>
+                      <p:cNvPicPr/>
+                      <p:nvPr/>
+                    </p:nvPicPr>
+                    <p:blipFill>
+                      <a:blip r:embed="rId12"/>
+                      <a:stretch>
+                        <a:fillRect/>
+                      </a:stretch>
+                    </p:blipFill>
+                    <p:spPr>
+                      <a:xfrm>
+                        <a:off x="3717449" y="4057458"/>
+                        <a:ext cx="952500" cy="438150"/>
+                      </a:xfrm>
+                      <a:prstGeom prst="rect">
+                        <a:avLst/>
+                      </a:prstGeom>
+                    </p:spPr>
+                  </p:pic>
+                </p:oleObj>
+              </mc:Fallback>
+            </mc:AlternateContent>
+          </a:graphicData>
+        </a:graphic>
+      </p:graphicFrame>
+      <p:graphicFrame>
+        <p:nvGraphicFramePr>
+          <p:cNvPr id="6" name="Objeto 5"/>
+          <p:cNvGraphicFramePr>
+            <a:graphicFrameLocks noChangeAspect="1"/>
+          </p:cNvGraphicFramePr>
+          <p:nvPr>
+            <p:extLst>
+              <p:ext uri="{D42A27DB-BD31-4B8C-83A1-F6EECF244321}">
+                <p14:modId xmlns:p14="http://schemas.microsoft.com/office/powerpoint/2010/main" val="1054474213"/>
+              </p:ext>
+            </p:extLst>
+          </p:nvPr>
+        </p:nvGraphicFramePr>
+        <p:xfrm>
+          <a:off x="3832225" y="4629320"/>
+          <a:ext cx="722947" cy="438150"/>
+        </p:xfrm>
+        <a:graphic>
+          <a:graphicData uri="http://schemas.openxmlformats.org/presentationml/2006/ole">
+            <mc:AlternateContent xmlns:mc="http://schemas.openxmlformats.org/markup-compatibility/2006">
+              <mc:Choice xmlns:v="urn:schemas-microsoft-com:vml" Requires="v">
+                <p:oleObj spid="_x0000_s1030" name="Objeto de Shell de Gerenciador" showAsIcon="1" r:id="rId13" imgW="740880" imgH="437760" progId="Package">
+                  <p:embed/>
+                </p:oleObj>
+              </mc:Choice>
+              <mc:Fallback>
+                <p:oleObj name="Objeto de Shell de Gerenciador" showAsIcon="1" r:id="rId13" imgW="740880" imgH="437760" progId="Package">
+                  <p:embed/>
+                  <p:pic>
+                    <p:nvPicPr>
+                      <p:cNvPr id="0" name=""/>
+                      <p:cNvPicPr/>
+                      <p:nvPr/>
+                    </p:nvPicPr>
+                    <p:blipFill>
+                      <a:blip r:embed="rId14"/>
+                      <a:stretch>
+                        <a:fillRect/>
+                      </a:stretch>
+                    </p:blipFill>
+                    <p:spPr>
+                      <a:xfrm>
+                        <a:off x="3832225" y="4629320"/>
+                        <a:ext cx="722947" cy="438150"/>
+                      </a:xfrm>
+                      <a:prstGeom prst="rect">
+                        <a:avLst/>
+                      </a:prstGeom>
+                    </p:spPr>
+                  </p:pic>
+                </p:oleObj>
+              </mc:Fallback>
+            </mc:AlternateContent>
+          </a:graphicData>
+        </a:graphic>
+      </p:graphicFrame>
+      <p:graphicFrame>
+        <p:nvGraphicFramePr>
+          <p:cNvPr id="7" name="Objeto 6"/>
+          <p:cNvGraphicFramePr>
+            <a:graphicFrameLocks noChangeAspect="1"/>
+          </p:cNvGraphicFramePr>
+          <p:nvPr>
+            <p:extLst>
+              <p:ext uri="{D42A27DB-BD31-4B8C-83A1-F6EECF244321}">
+                <p14:modId xmlns:p14="http://schemas.microsoft.com/office/powerpoint/2010/main" val="2218192409"/>
+              </p:ext>
+            </p:extLst>
+          </p:nvPr>
+        </p:nvGraphicFramePr>
+        <p:xfrm>
+          <a:off x="3920648" y="4982107"/>
+          <a:ext cx="546100" cy="438150"/>
+        </p:xfrm>
+        <a:graphic>
+          <a:graphicData uri="http://schemas.openxmlformats.org/presentationml/2006/ole">
+            <mc:AlternateContent xmlns:mc="http://schemas.openxmlformats.org/markup-compatibility/2006">
+              <mc:Choice xmlns:v="urn:schemas-microsoft-com:vml" Requires="v">
+                <p:oleObj spid="_x0000_s1031" name="Objeto de Shell de Gerenciador" showAsIcon="1" r:id="rId15" imgW="545760" imgH="437760" progId="Package">
+                  <p:embed/>
+                </p:oleObj>
+              </mc:Choice>
+              <mc:Fallback>
+                <p:oleObj name="Objeto de Shell de Gerenciador" showAsIcon="1" r:id="rId15" imgW="545760" imgH="437760" progId="Package">
+                  <p:embed/>
+                  <p:pic>
+                    <p:nvPicPr>
+                      <p:cNvPr id="0" name=""/>
+                      <p:cNvPicPr/>
+                      <p:nvPr/>
+                    </p:nvPicPr>
+                    <p:blipFill>
+                      <a:blip r:embed="rId16"/>
+                      <a:stretch>
+                        <a:fillRect/>
+                      </a:stretch>
+                    </p:blipFill>
+                    <p:spPr>
+                      <a:xfrm>
+                        <a:off x="3920648" y="4982107"/>
+                        <a:ext cx="546100" cy="438150"/>
+                      </a:xfrm>
+                      <a:prstGeom prst="rect">
+                        <a:avLst/>
+                      </a:prstGeom>
+                    </p:spPr>
+                  </p:pic>
+                </p:oleObj>
+              </mc:Fallback>
+            </mc:AlternateContent>
           </a:graphicData>
         </a:graphic>
       </p:graphicFrame>
@@ -7650,12 +7972,6 @@
               </a:rPr>
               <a:t>3 – VÍDEO DEMONSTRATIVO DA SOLUÇÃO</a:t>
             </a:r>
-            <a:endParaRPr lang="pt-BR" sz="2400" dirty="0">
-              <a:solidFill>
-                <a:srgbClr val="626E73"/>
-              </a:solidFill>
-              <a:latin typeface="Gotham HTF Light"/>
-            </a:endParaRPr>
           </a:p>
         </p:txBody>
       </p:sp>
@@ -7718,7 +8034,7 @@
             <p:nvPr/>
           </p:nvPicPr>
           <p:blipFill>
-            <a:blip r:embed="rId1">
+            <a:blip r:embed="rId2">
               <a:extLst>
                 <a:ext uri="{28A0092B-C50C-407E-A947-70E740481C1C}">
                   <a14:useLocalDpi xmlns:a14="http://schemas.microsoft.com/office/drawing/2010/main" val="0"/>
@@ -7748,7 +8064,7 @@
             <p:nvPr/>
           </p:nvPicPr>
           <p:blipFill>
-            <a:blip r:embed="rId2">
+            <a:blip r:embed="rId3">
               <a:extLst>
                 <a:ext uri="{28A0092B-C50C-407E-A947-70E740481C1C}">
                   <a14:useLocalDpi xmlns:a14="http://schemas.microsoft.com/office/drawing/2010/main" val="0"/>
@@ -7814,14 +8130,6 @@
               </a:rPr>
               <a:t>DEMONSTRAÇÃO DO USO</a:t>
             </a:r>
-            <a:endParaRPr lang="pt-BR" b="1" dirty="0">
-              <a:solidFill>
-                <a:schemeClr val="tx1">
-                  <a:lumMod val="65000"/>
-                  <a:lumOff val="35000"/>
-                </a:schemeClr>
-              </a:solidFill>
-            </a:endParaRPr>
           </a:p>
         </p:txBody>
       </p:sp>
@@ -7831,7 +8139,13 @@
           <p:cNvGraphicFramePr>
             <a:graphicFrameLocks noGrp="1"/>
           </p:cNvGraphicFramePr>
-          <p:nvPr/>
+          <p:nvPr>
+            <p:extLst>
+              <p:ext uri="{D42A27DB-BD31-4B8C-83A1-F6EECF244321}">
+                <p14:modId xmlns:p14="http://schemas.microsoft.com/office/powerpoint/2010/main" val="3578044281"/>
+              </p:ext>
+            </p:extLst>
+          </p:nvPr>
         </p:nvGraphicFramePr>
         <p:xfrm>
           <a:off x="209853" y="1343385"/>
@@ -7844,8 +8158,20 @@
                 <a:tableStyleId>{5C22544A-7EE6-4342-B048-85BDC9FD1C3A}</a:tableStyleId>
               </a:tblPr>
               <a:tblGrid>
-                <a:gridCol w="1972238"/>
-                <a:gridCol w="4466057"/>
+                <a:gridCol w="1972238">
+                  <a:extLst>
+                    <a:ext uri="{9D8B030D-6E8A-4147-A177-3AD203B41FA5}">
+                      <a16:colId xmlns:a16="http://schemas.microsoft.com/office/drawing/2014/main" val="20000"/>
+                    </a:ext>
+                  </a:extLst>
+                </a:gridCol>
+                <a:gridCol w="4466057">
+                  <a:extLst>
+                    <a:ext uri="{9D8B030D-6E8A-4147-A177-3AD203B41FA5}">
+                      <a16:colId xmlns:a16="http://schemas.microsoft.com/office/drawing/2014/main" val="20001"/>
+                    </a:ext>
+                  </a:extLst>
+                </a:gridCol>
               </a:tblGrid>
               <a:tr h="370497">
                 <a:tc>
@@ -7858,7 +8184,6 @@
                         <a:rPr lang="pt-BR" sz="1400" dirty="0"/>
                         <a:t>PLATAFORMA</a:t>
                       </a:r>
-                      <a:endParaRPr lang="pt-BR" sz="1400" dirty="0"/>
                     </a:p>
                   </a:txBody>
                   <a:tcPr marL="91355" marR="91355" marT="45678" marB="45678"/>
@@ -7873,11 +8198,15 @@
                         <a:rPr lang="pt-BR" sz="1400" dirty="0"/>
                         <a:t>LINK</a:t>
                       </a:r>
-                      <a:endParaRPr lang="pt-BR" sz="1400" dirty="0"/>
                     </a:p>
                   </a:txBody>
                   <a:tcPr marL="91355" marR="91355" marT="45678" marB="45678"/>
                 </a:tc>
+                <a:extLst>
+                  <a:ext uri="{0D108BD9-81ED-4DB2-BD59-A6C34878D82A}">
+                    <a16:rowId xmlns:a16="http://schemas.microsoft.com/office/drawing/2014/main" val="10000"/>
+                  </a:ext>
+                </a:extLst>
               </a:tr>
               <a:tr h="960036">
                 <a:tc>
@@ -7892,7 +8221,7 @@
                       <a:pPr algn="ctr"/>
                       <a:r>
                         <a:rPr lang="pt-BR" sz="1400" dirty="0">
-                          <a:hlinkClick r:id="rId3"/>
+                          <a:hlinkClick r:id="rId4"/>
                         </a:rPr>
                         <a:t>https://www.loom.com/screen-recorder</a:t>
                       </a:r>
@@ -7900,7 +8229,6 @@
                         <a:rPr lang="pt-BR" sz="1400" dirty="0"/>
                         <a:t> </a:t>
                       </a:r>
-                      <a:endParaRPr lang="pt-BR" sz="1400" dirty="0"/>
                     </a:p>
                   </a:txBody>
                   <a:tcPr marL="91355" marR="91355" marT="45678" marB="45678"/>
@@ -7926,156 +8254,29 @@
                         <a:buNone/>
                         <a:defRPr/>
                       </a:pPr>
+                      <a:r>
+                        <a:rPr lang="en-US" sz="1400" dirty="0" smtClean="0">
+                          <a:hlinkClick r:id="rId5"/>
+                        </a:rPr>
+                        <a:t>https://www.loom.com/share/edc26089fa384a639288b60a841d66de</a:t>
+                      </a:r>
                       <a:endParaRPr lang="en-US" sz="1400" dirty="0">
-                        <a:hlinkClick r:id="rId4"/>
+                        <a:hlinkClick r:id="rId5"/>
                       </a:endParaRPr>
-                    </a:p>
-                    <a:p>
-                      <a:pPr algn="ctr"/>
-                      <a:r>
-                        <a:rPr lang="pt-BR" sz="1400" dirty="0" err="1"/>
-                        <a:t>https</a:t>
-                      </a:r>
-                      <a:r>
-                        <a:rPr lang="pt-BR" sz="1400" dirty="0"/>
-                        <a:t>://</a:t>
-                      </a:r>
-                      <a:r>
-                        <a:rPr lang="pt-BR" sz="1400" dirty="0" err="1"/>
-                        <a:t>www.loom.com</a:t>
-                      </a:r>
-                      <a:r>
-                        <a:rPr lang="pt-BR" sz="1400" dirty="0"/>
-                        <a:t>/</a:t>
-                      </a:r>
-                      <a:r>
-                        <a:rPr lang="pt-BR" sz="1400" dirty="0" err="1"/>
-                        <a:t>share</a:t>
-                      </a:r>
-                      <a:r>
-                        <a:rPr lang="pt-BR" sz="1400" dirty="0"/>
-                        <a:t>/6960f41e8b3d482ab1c9e9a49fe58acf</a:t>
-                      </a:r>
-                      <a:endParaRPr lang="pt-BR" sz="1400" dirty="0"/>
                     </a:p>
                   </a:txBody>
                   <a:tcPr marL="91355" marR="91355" marT="45678" marB="45678"/>
                 </a:tc>
+                <a:extLst>
+                  <a:ext uri="{0D108BD9-81ED-4DB2-BD59-A6C34878D82A}">
+                    <a16:rowId xmlns:a16="http://schemas.microsoft.com/office/drawing/2014/main" val="10001"/>
+                  </a:ext>
+                </a:extLst>
               </a:tr>
             </a:tbl>
           </a:graphicData>
         </a:graphic>
       </p:graphicFrame>
-      <p:pic>
-        <p:nvPicPr>
-          <p:cNvPr id="13" name="Imagem 12"/>
-          <p:cNvPicPr>
-            <a:picLocks noChangeAspect="1"/>
-          </p:cNvPicPr>
-          <p:nvPr/>
-        </p:nvPicPr>
-        <p:blipFill>
-          <a:blip r:embed="rId5"/>
-          <a:stretch>
-            <a:fillRect/>
-          </a:stretch>
-        </p:blipFill>
-        <p:spPr>
-          <a:xfrm>
-            <a:off x="209854" y="2955808"/>
-            <a:ext cx="2717432" cy="1997955"/>
-          </a:xfrm>
-          <a:prstGeom prst="rect">
-            <a:avLst/>
-          </a:prstGeom>
-        </p:spPr>
-      </p:pic>
-      <p:sp>
-        <p:nvSpPr>
-          <p:cNvPr id="15" name="Retângulo 14"/>
-          <p:cNvSpPr/>
-          <p:nvPr/>
-        </p:nvSpPr>
-        <p:spPr>
-          <a:xfrm>
-            <a:off x="3076998" y="3733910"/>
-            <a:ext cx="3283694" cy="577081"/>
-          </a:xfrm>
-          <a:prstGeom prst="rect">
-            <a:avLst/>
-          </a:prstGeom>
-        </p:spPr>
-        <p:txBody>
-          <a:bodyPr wrap="square">
-            <a:spAutoFit/>
-          </a:bodyPr>
-          <a:lstStyle/>
-          <a:p>
-            <a:pPr algn="ctr"/>
-            <a:r>
-              <a:rPr lang="pt-BR" sz="1050" i="1" dirty="0">
-                <a:solidFill>
-                  <a:srgbClr val="1D1C1D"/>
-                </a:solidFill>
-                <a:latin typeface="Slack-Lato"/>
-              </a:rPr>
-              <a:t>Exibir durante a apresentação da última aula.</a:t>
-            </a:r>
-            <a:endParaRPr lang="pt-BR" sz="1050" i="1" dirty="0">
-              <a:solidFill>
-                <a:srgbClr val="1D1C1D"/>
-              </a:solidFill>
-              <a:latin typeface="Slack-Lato"/>
-            </a:endParaRPr>
-          </a:p>
-          <a:p>
-            <a:pPr algn="ctr"/>
-            <a:endParaRPr lang="pt-BR" sz="1050" i="1" dirty="0">
-              <a:solidFill>
-                <a:srgbClr val="1D1C1D"/>
-              </a:solidFill>
-              <a:latin typeface="Slack-Lato"/>
-            </a:endParaRPr>
-          </a:p>
-          <a:p>
-            <a:pPr algn="ctr"/>
-            <a:r>
-              <a:rPr lang="pt-BR" sz="1050" i="1" dirty="0">
-                <a:solidFill>
-                  <a:srgbClr val="1D1C1D"/>
-                </a:solidFill>
-                <a:latin typeface="Slack-Lato"/>
-              </a:rPr>
-              <a:t>Exemplos: </a:t>
-            </a:r>
-            <a:r>
-              <a:rPr lang="pt-BR" sz="1050" i="1" dirty="0">
-                <a:solidFill>
-                  <a:srgbClr val="1D1C1D"/>
-                </a:solidFill>
-                <a:latin typeface="Slack-Lato"/>
-                <a:hlinkClick r:id="rId6"/>
-              </a:rPr>
-              <a:t>https://github.com/tonanuvem/hall</a:t>
-            </a:r>
-            <a:r>
-              <a:rPr lang="pt-BR" sz="1050" i="1" dirty="0">
-                <a:solidFill>
-                  <a:srgbClr val="1D1C1D"/>
-                </a:solidFill>
-                <a:latin typeface="Slack-Lato"/>
-              </a:rPr>
-              <a:t> </a:t>
-            </a:r>
-            <a:endParaRPr lang="pt-BR" sz="1050" i="1" dirty="0">
-              <a:solidFill>
-                <a:srgbClr val="1D1C1D"/>
-              </a:solidFill>
-              <a:latin typeface="Slack-Lato"/>
-            </a:endParaRPr>
-          </a:p>
-        </p:txBody>
-      </p:sp>
     </p:spTree>
   </p:cSld>
   <p:clrMapOvr>
@@ -8400,6 +8601,7 @@
       </a:style>
     </a:lnDef>
   </a:objectDefaults>
+  <a:extraClrSchemeLst/>
   <a:extLst>
     <a:ext uri="{05A4C25C-085E-4340-85A3-A5531E510DB2}">
       <thm15:themeFamily xmlns:thm15="http://schemas.microsoft.com/office/thememl/2012/main" name="Office Theme" id="{62F939B6-93AF-4DB8-9C6B-D6C7DFDC589F}" vid="{4A3C46E8-61CC-4603-A589-7422A47A8E4A}"/>
@@ -8724,6 +8926,7 @@
       </a:style>
     </a:lnDef>
   </a:objectDefaults>
+  <a:extraClrSchemeLst/>
   <a:extLst>
     <a:ext uri="{05A4C25C-085E-4340-85A3-A5531E510DB2}">
       <thm15:themeFamily xmlns:thm15="http://schemas.microsoft.com/office/thememl/2012/main" name="Office Theme" id="{62F939B6-93AF-4DB8-9C6B-D6C7DFDC589F}" vid="{4A3C46E8-61CC-4603-A589-7422A47A8E4A}"/>

</xml_diff>